<commit_message>
Add how to use coreboot chapter.
</commit_message>
<xml_diff>
--- a/UnderstandOfChromiumOS.pptx
+++ b/UnderstandOfChromiumOS.pptx
@@ -18,6 +18,13 @@
     <p:sldId id="267" r:id="rId11"/>
     <p:sldId id="268" r:id="rId12"/>
     <p:sldId id="259" r:id="rId13"/>
+    <p:sldId id="270" r:id="rId14"/>
+    <p:sldId id="271" r:id="rId15"/>
+    <p:sldId id="272" r:id="rId16"/>
+    <p:sldId id="273" r:id="rId17"/>
+    <p:sldId id="274" r:id="rId18"/>
+    <p:sldId id="275" r:id="rId19"/>
+    <p:sldId id="276" r:id="rId20"/>
   </p:sldIdLst>
   <p:sldSz cx="12192000" cy="6858000"/>
   <p:notesSz cx="6858000" cy="9144000"/>
@@ -569,6 +576,155 @@
 </p:notes>
 </file>
 
+<file path=ppt/notesSlides/notesSlide3.xml><?xml version="1.0" encoding="utf-8"?>
+<p:notes xmlns:a="http://schemas.openxmlformats.org/drawingml/2006/main" xmlns:r="http://schemas.openxmlformats.org/officeDocument/2006/relationships" xmlns:p="http://schemas.openxmlformats.org/presentationml/2006/main">
+  <p:cSld>
+    <p:spTree>
+      <p:nvGrpSpPr>
+        <p:cNvPr id="1" name=""/>
+        <p:cNvGrpSpPr/>
+        <p:nvPr/>
+      </p:nvGrpSpPr>
+      <p:grpSpPr/>
+      <p:sp>
+        <p:nvSpPr>
+          <p:cNvPr id="2" name="Slide Image Placeholder 1"/>
+          <p:cNvSpPr/>
+          <p:nvPr>
+            <p:ph type="sldImg" idx="2"/>
+          </p:nvPr>
+        </p:nvSpPr>
+        <p:spPr/>
+      </p:sp>
+      <p:sp>
+        <p:nvSpPr>
+          <p:cNvPr id="3" name="Text Placeholder 2"/>
+          <p:cNvSpPr/>
+          <p:nvPr>
+            <p:ph type="body" idx="3"/>
+          </p:nvPr>
+        </p:nvSpPr>
+        <p:spPr/>
+        <p:txBody>
+          <a:bodyPr/>
+          <a:p>
+            <a:r>
+              <a:rPr lang="x-none" altLang="en-US"/>
+              <a:t>Reference : </a:t>
+            </a:r>
+            <a:endParaRPr lang="x-none" altLang="en-US"/>
+          </a:p>
+          <a:p>
+            <a:r>
+              <a:rPr lang="x-none" altLang="en-US"/>
+              <a:t>For ME firmware: https://v2bv.net/2017/intel-me</a:t>
+            </a:r>
+            <a:endParaRPr lang="x-none" altLang="en-US"/>
+          </a:p>
+        </p:txBody>
+      </p:sp>
+      <p:sp>
+        <p:nvSpPr>
+          <p:cNvPr id="4" name="Slide Number Placeholder 3"/>
+          <p:cNvSpPr>
+            <a:spLocks noGrp="1"/>
+          </p:cNvSpPr>
+          <p:nvPr>
+            <p:ph type="sldNum" sz="quarter" idx="5"/>
+          </p:nvPr>
+        </p:nvSpPr>
+        <p:spPr/>
+        <p:txBody>
+          <a:bodyPr/>
+          <a:p>
+            <a:fld id="{A6837353-30EB-4A48-80EB-173D804AEFBD}" type="slidenum">
+              <a:rPr lang="zh-CN" altLang="en-US" smtClean="0"/>
+            </a:fld>
+            <a:endParaRPr lang="zh-CN" altLang="en-US"/>
+          </a:p>
+        </p:txBody>
+      </p:sp>
+    </p:spTree>
+  </p:cSld>
+  <p:clrMapOvr>
+    <a:masterClrMapping/>
+  </p:clrMapOvr>
+</p:notes>
+</file>
+
+<file path=ppt/notesSlides/notesSlide4.xml><?xml version="1.0" encoding="utf-8"?>
+<p:notes xmlns:a="http://schemas.openxmlformats.org/drawingml/2006/main" xmlns:r="http://schemas.openxmlformats.org/officeDocument/2006/relationships" xmlns:p="http://schemas.openxmlformats.org/presentationml/2006/main">
+  <p:cSld>
+    <p:spTree>
+      <p:nvGrpSpPr>
+        <p:cNvPr id="1" name=""/>
+        <p:cNvGrpSpPr/>
+        <p:nvPr/>
+      </p:nvGrpSpPr>
+      <p:grpSpPr/>
+      <p:sp>
+        <p:nvSpPr>
+          <p:cNvPr id="2" name="Slide Image Placeholder 1"/>
+          <p:cNvSpPr/>
+          <p:nvPr>
+            <p:ph type="sldImg" idx="2"/>
+          </p:nvPr>
+        </p:nvSpPr>
+        <p:spPr/>
+      </p:sp>
+      <p:sp>
+        <p:nvSpPr>
+          <p:cNvPr id="3" name="Text Placeholder 2"/>
+          <p:cNvSpPr/>
+          <p:nvPr>
+            <p:ph type="body" idx="3"/>
+          </p:nvPr>
+        </p:nvSpPr>
+        <p:spPr/>
+        <p:txBody>
+          <a:bodyPr/>
+          <a:p>
+            <a:r>
+              <a:rPr lang="en-US"/>
+              <a:t>Assemble GRUB executable for coreboot</a:t>
+            </a:r>
+            <a:r>
+              <a:rPr lang="x-none" altLang="en-US"/>
+              <a:t>: https://github.com/hardenedlinux/Debian-GNU-Linux-Profiles/blob/master/docs/hardened_boot/grub-for-coreboot.md</a:t>
+            </a:r>
+            <a:endParaRPr lang="x-none" altLang="en-US"/>
+          </a:p>
+        </p:txBody>
+      </p:sp>
+      <p:sp>
+        <p:nvSpPr>
+          <p:cNvPr id="4" name="Slide Number Placeholder 3"/>
+          <p:cNvSpPr>
+            <a:spLocks noGrp="1"/>
+          </p:cNvSpPr>
+          <p:nvPr>
+            <p:ph type="sldNum" sz="quarter" idx="5"/>
+          </p:nvPr>
+        </p:nvSpPr>
+        <p:spPr/>
+        <p:txBody>
+          <a:bodyPr/>
+          <a:p>
+            <a:fld id="{A6837353-30EB-4A48-80EB-173D804AEFBD}" type="slidenum">
+              <a:rPr lang="zh-CN" altLang="en-US" smtClean="0"/>
+            </a:fld>
+            <a:endParaRPr lang="zh-CN" altLang="en-US"/>
+          </a:p>
+        </p:txBody>
+      </p:sp>
+    </p:spTree>
+  </p:cSld>
+  <p:clrMapOvr>
+    <a:masterClrMapping/>
+  </p:clrMapOvr>
+</p:notes>
+</file>
+
 <file path=ppt/slideLayouts/slideLayout1.xml><?xml version="1.0" encoding="utf-8"?>
 <p:sldLayout xmlns:a="http://schemas.openxmlformats.org/drawingml/2006/main" xmlns:r="http://schemas.openxmlformats.org/officeDocument/2006/relationships" xmlns:p="http://schemas.openxmlformats.org/presentationml/2006/main" type="title" preserve="1">
   <p:cSld name="标题幻灯片">
@@ -593,7 +749,7 @@
             <a:spLocks noGrp="1"/>
           </p:cNvSpPr>
           <p:nvPr>
-            <p:ph type="ctrTitle"/>
+            <p:ph type="ctrTitle" hasCustomPrompt="1"/>
           </p:nvPr>
         </p:nvSpPr>
         <p:spPr>
@@ -625,7 +781,7 @@
             <a:spLocks noGrp="1"/>
           </p:cNvSpPr>
           <p:nvPr>
-            <p:ph type="subTitle" idx="1"/>
+            <p:ph type="subTitle" idx="1" hasCustomPrompt="1"/>
           </p:nvPr>
         </p:nvSpPr>
         <p:spPr>
@@ -778,7 +934,7 @@
             <a:spLocks noGrp="1"/>
           </p:cNvSpPr>
           <p:nvPr>
-            <p:ph type="title"/>
+            <p:ph type="title" hasCustomPrompt="1"/>
           </p:nvPr>
         </p:nvSpPr>
         <p:spPr/>
@@ -801,7 +957,7 @@
             <a:spLocks noGrp="1"/>
           </p:cNvSpPr>
           <p:nvPr>
-            <p:ph type="body" orient="vert" idx="1"/>
+            <p:ph type="body" orient="vert" idx="1" hasCustomPrompt="1"/>
           </p:nvPr>
         </p:nvSpPr>
         <p:spPr/>
@@ -945,7 +1101,7 @@
             <a:spLocks noGrp="1"/>
           </p:cNvSpPr>
           <p:nvPr>
-            <p:ph type="title" orient="vert"/>
+            <p:ph type="title" orient="vert" hasCustomPrompt="1"/>
           </p:nvPr>
         </p:nvSpPr>
         <p:spPr>
@@ -973,7 +1129,7 @@
             <a:spLocks noGrp="1"/>
           </p:cNvSpPr>
           <p:nvPr>
-            <p:ph type="body" orient="vert" idx="1"/>
+            <p:ph type="body" orient="vert" idx="1" hasCustomPrompt="1"/>
           </p:nvPr>
         </p:nvSpPr>
         <p:spPr>
@@ -1122,7 +1278,7 @@
             <a:spLocks noGrp="1"/>
           </p:cNvSpPr>
           <p:nvPr>
-            <p:ph type="title"/>
+            <p:ph type="title" hasCustomPrompt="1"/>
           </p:nvPr>
         </p:nvSpPr>
         <p:spPr/>
@@ -1145,7 +1301,7 @@
             <a:spLocks noGrp="1"/>
           </p:cNvSpPr>
           <p:nvPr>
-            <p:ph idx="1"/>
+            <p:ph idx="1" hasCustomPrompt="1"/>
           </p:nvPr>
         </p:nvSpPr>
         <p:spPr/>
@@ -1289,7 +1445,7 @@
             <a:spLocks noGrp="1"/>
           </p:cNvSpPr>
           <p:nvPr>
-            <p:ph type="title"/>
+            <p:ph type="title" hasCustomPrompt="1"/>
           </p:nvPr>
         </p:nvSpPr>
         <p:spPr>
@@ -1321,7 +1477,7 @@
             <a:spLocks noGrp="1"/>
           </p:cNvSpPr>
           <p:nvPr>
-            <p:ph type="body" idx="1"/>
+            <p:ph type="body" idx="1" hasCustomPrompt="1"/>
           </p:nvPr>
         </p:nvSpPr>
         <p:spPr>
@@ -1529,7 +1685,7 @@
             <a:spLocks noGrp="1"/>
           </p:cNvSpPr>
           <p:nvPr>
-            <p:ph type="title"/>
+            <p:ph type="title" hasCustomPrompt="1"/>
           </p:nvPr>
         </p:nvSpPr>
         <p:spPr/>
@@ -1552,7 +1708,7 @@
             <a:spLocks noGrp="1"/>
           </p:cNvSpPr>
           <p:nvPr>
-            <p:ph sz="half" idx="1"/>
+            <p:ph sz="half" idx="1" hasCustomPrompt="1"/>
           </p:nvPr>
         </p:nvSpPr>
         <p:spPr>
@@ -1613,7 +1769,7 @@
             <a:spLocks noGrp="1"/>
           </p:cNvSpPr>
           <p:nvPr>
-            <p:ph sz="half" idx="2"/>
+            <p:ph sz="half" idx="2" hasCustomPrompt="1"/>
           </p:nvPr>
         </p:nvSpPr>
         <p:spPr>
@@ -1762,7 +1918,7 @@
             <a:spLocks noGrp="1"/>
           </p:cNvSpPr>
           <p:nvPr>
-            <p:ph type="title"/>
+            <p:ph type="title" hasCustomPrompt="1"/>
           </p:nvPr>
         </p:nvSpPr>
         <p:spPr>
@@ -1790,7 +1946,7 @@
             <a:spLocks noGrp="1"/>
           </p:cNvSpPr>
           <p:nvPr>
-            <p:ph type="body" idx="1"/>
+            <p:ph type="body" idx="1" hasCustomPrompt="1"/>
           </p:nvPr>
         </p:nvSpPr>
         <p:spPr>
@@ -1856,7 +2012,7 @@
             <a:spLocks noGrp="1"/>
           </p:cNvSpPr>
           <p:nvPr>
-            <p:ph sz="half" idx="2"/>
+            <p:ph sz="half" idx="2" hasCustomPrompt="1"/>
           </p:nvPr>
         </p:nvSpPr>
         <p:spPr>
@@ -1917,7 +2073,7 @@
             <a:spLocks noGrp="1"/>
           </p:cNvSpPr>
           <p:nvPr>
-            <p:ph type="body" sz="quarter" idx="3"/>
+            <p:ph type="body" sz="quarter" idx="3" hasCustomPrompt="1"/>
           </p:nvPr>
         </p:nvSpPr>
         <p:spPr>
@@ -1983,7 +2139,7 @@
             <a:spLocks noGrp="1"/>
           </p:cNvSpPr>
           <p:nvPr>
-            <p:ph sz="quarter" idx="4"/>
+            <p:ph sz="quarter" idx="4" hasCustomPrompt="1"/>
           </p:nvPr>
         </p:nvSpPr>
         <p:spPr>
@@ -2132,7 +2288,7 @@
             <a:spLocks noGrp="1"/>
           </p:cNvSpPr>
           <p:nvPr>
-            <p:ph type="title"/>
+            <p:ph type="title" hasCustomPrompt="1"/>
           </p:nvPr>
         </p:nvSpPr>
         <p:spPr/>
@@ -2331,7 +2487,7 @@
             <a:spLocks noGrp="1"/>
           </p:cNvSpPr>
           <p:nvPr>
-            <p:ph type="title"/>
+            <p:ph type="title" hasCustomPrompt="1"/>
           </p:nvPr>
         </p:nvSpPr>
         <p:spPr>
@@ -2363,7 +2519,7 @@
             <a:spLocks noGrp="1"/>
           </p:cNvSpPr>
           <p:nvPr>
-            <p:ph idx="1"/>
+            <p:ph idx="1" hasCustomPrompt="1"/>
           </p:nvPr>
         </p:nvSpPr>
         <p:spPr>
@@ -2452,7 +2608,7 @@
             <a:spLocks noGrp="1"/>
           </p:cNvSpPr>
           <p:nvPr>
-            <p:ph type="body" sz="half" idx="2"/>
+            <p:ph type="body" sz="half" idx="2" hasCustomPrompt="1"/>
           </p:nvPr>
         </p:nvSpPr>
         <p:spPr>
@@ -2606,7 +2762,7 @@
             <a:spLocks noGrp="1"/>
           </p:cNvSpPr>
           <p:nvPr>
-            <p:ph type="title"/>
+            <p:ph type="title" hasCustomPrompt="1"/>
           </p:nvPr>
         </p:nvSpPr>
         <p:spPr>
@@ -2699,7 +2855,7 @@
             <a:spLocks noGrp="1"/>
           </p:cNvSpPr>
           <p:nvPr>
-            <p:ph type="body" sz="half" idx="2"/>
+            <p:ph type="body" sz="half" idx="2" hasCustomPrompt="1"/>
           </p:nvPr>
         </p:nvSpPr>
         <p:spPr>
@@ -3111,7 +3267,7 @@
         <a:spcBef>
           <a:spcPts val="1000"/>
         </a:spcBef>
-        <a:buFont typeface="Arial" panose="020B0604020202020204" pitchFamily="34" charset="0"/>
+        <a:buFont typeface="Arial" charset="0"/>
         <a:buChar char="•"/>
         <a:defRPr sz="2800" kern="1200">
           <a:solidFill>
@@ -3129,7 +3285,7 @@
         <a:spcBef>
           <a:spcPts val="500"/>
         </a:spcBef>
-        <a:buFont typeface="Arial" panose="020B0604020202020204" pitchFamily="34" charset="0"/>
+        <a:buFont typeface="Arial" charset="0"/>
         <a:buChar char="•"/>
         <a:defRPr sz="2400" kern="1200">
           <a:solidFill>
@@ -3147,7 +3303,7 @@
         <a:spcBef>
           <a:spcPts val="500"/>
         </a:spcBef>
-        <a:buFont typeface="Arial" panose="020B0604020202020204" pitchFamily="34" charset="0"/>
+        <a:buFont typeface="Arial" charset="0"/>
         <a:buChar char="•"/>
         <a:defRPr sz="2000" kern="1200">
           <a:solidFill>
@@ -3165,7 +3321,7 @@
         <a:spcBef>
           <a:spcPts val="500"/>
         </a:spcBef>
-        <a:buFont typeface="Arial" panose="020B0604020202020204" pitchFamily="34" charset="0"/>
+        <a:buFont typeface="Arial" charset="0"/>
         <a:buChar char="•"/>
         <a:defRPr sz="1800" kern="1200">
           <a:solidFill>
@@ -3183,7 +3339,7 @@
         <a:spcBef>
           <a:spcPts val="500"/>
         </a:spcBef>
-        <a:buFont typeface="Arial" panose="020B0604020202020204" pitchFamily="34" charset="0"/>
+        <a:buFont typeface="Arial" charset="0"/>
         <a:buChar char="•"/>
         <a:defRPr sz="1800" kern="1200">
           <a:solidFill>
@@ -3201,7 +3357,7 @@
         <a:spcBef>
           <a:spcPts val="500"/>
         </a:spcBef>
-        <a:buFont typeface="Arial" panose="020B0604020202020204" pitchFamily="34" charset="0"/>
+        <a:buFont typeface="Arial" charset="0"/>
         <a:buChar char="•"/>
         <a:defRPr sz="1800" kern="1200">
           <a:solidFill>
@@ -3219,7 +3375,7 @@
         <a:spcBef>
           <a:spcPts val="500"/>
         </a:spcBef>
-        <a:buFont typeface="Arial" panose="020B0604020202020204" pitchFamily="34" charset="0"/>
+        <a:buFont typeface="Arial" charset="0"/>
         <a:buChar char="•"/>
         <a:defRPr sz="1800" kern="1200">
           <a:solidFill>
@@ -3237,7 +3393,7 @@
         <a:spcBef>
           <a:spcPts val="500"/>
         </a:spcBef>
-        <a:buFont typeface="Arial" panose="020B0604020202020204" pitchFamily="34" charset="0"/>
+        <a:buFont typeface="Arial" charset="0"/>
         <a:buChar char="•"/>
         <a:defRPr sz="1800" kern="1200">
           <a:solidFill>
@@ -3255,7 +3411,7 @@
         <a:spcBef>
           <a:spcPts val="500"/>
         </a:spcBef>
-        <a:buFont typeface="Arial" panose="020B0604020202020204" pitchFamily="34" charset="0"/>
+        <a:buFont typeface="Arial" charset="0"/>
         <a:buChar char="•"/>
         <a:defRPr sz="1800" kern="1200">
           <a:solidFill>
@@ -3512,6 +3668,1611 @@
           </a:p>
           <a:p>
             <a:endParaRPr lang="en-US" altLang="zh-CN"/>
+          </a:p>
+        </p:txBody>
+      </p:sp>
+    </p:spTree>
+  </p:cSld>
+  <p:clrMapOvr>
+    <a:masterClrMapping/>
+  </p:clrMapOvr>
+</p:sld>
+</file>
+
+<file path=ppt/slides/slide11.xml><?xml version="1.0" encoding="utf-8"?>
+<p:sld xmlns:a="http://schemas.openxmlformats.org/drawingml/2006/main" xmlns:r="http://schemas.openxmlformats.org/officeDocument/2006/relationships" xmlns:p="http://schemas.openxmlformats.org/presentationml/2006/main">
+  <p:cSld>
+    <p:spTree>
+      <p:nvGrpSpPr>
+        <p:cNvPr id="1" name=""/>
+        <p:cNvGrpSpPr/>
+        <p:nvPr/>
+      </p:nvGrpSpPr>
+      <p:grpSpPr/>
+      <p:sp>
+        <p:nvSpPr>
+          <p:cNvPr id="2" name="Title 1"/>
+          <p:cNvSpPr>
+            <a:spLocks noGrp="1"/>
+          </p:cNvSpPr>
+          <p:nvPr>
+            <p:ph type="title"/>
+          </p:nvPr>
+        </p:nvSpPr>
+        <p:spPr/>
+        <p:txBody>
+          <a:bodyPr>
+            <a:normAutofit/>
+          </a:bodyPr>
+          <a:p>
+            <a:r>
+              <a:rPr lang="en-US"/>
+              <a:t>淺談 Malicious Engine</a:t>
+            </a:r>
+            <a:br>
+              <a:rPr lang="en-US"/>
+            </a:br>
+            <a:r>
+              <a:rPr lang="en-US" sz="2400"/>
+              <a:t>https://v2bv.net/2017/intel-me</a:t>
+            </a:r>
+            <a:endParaRPr lang="en-US" sz="2400"/>
+          </a:p>
+        </p:txBody>
+      </p:sp>
+      <p:sp>
+        <p:nvSpPr>
+          <p:cNvPr id="3" name="Content Placeholder 2"/>
+          <p:cNvSpPr>
+            <a:spLocks noGrp="1"/>
+          </p:cNvSpPr>
+          <p:nvPr>
+            <p:ph idx="1"/>
+          </p:nvPr>
+        </p:nvSpPr>
+        <p:spPr/>
+        <p:txBody>
+          <a:bodyPr>
+            <a:normAutofit/>
+          </a:bodyPr>
+          <a:p>
+            <a:r>
+              <a:rPr lang="en-US"/>
+              <a:t>什麼是 ME？</a:t>
+            </a:r>
+            <a:endParaRPr lang="en-US"/>
+          </a:p>
+          <a:p>
+            <a:pPr lvl="1"/>
+            <a:r>
+              <a:rPr lang="en-US"/>
+              <a:t>Intel ME 是 Intel Management Engine 的簡稱。</a:t>
+            </a:r>
+            <a:endParaRPr lang="en-US"/>
+          </a:p>
+          <a:p>
+            <a:pPr lvl="1"/>
+            <a:r>
+              <a:rPr lang="en-US"/>
+              <a:t>Intel ME 是一個擁有從底層控制硬件能力的、獨立與處理器和操作系統的框架，它對於操作系統也是隱形的。簡單點說就是擁有極高的權限。其中 Intel Active Management Technology（英特爾主動管理技術）是運行與 ME 框架上的應用的一個例子。</a:t>
+            </a:r>
+            <a:endParaRPr lang="en-US"/>
+          </a:p>
+          <a:p>
+            <a:pPr lvl="1"/>
+            <a:r>
+              <a:rPr lang="en-US"/>
+              <a:t>Intel ME 被搭載在幾乎所有的 2006 年之後上市出售的 intel 平臺上。硬件部分整合在 CPU 或是主板芯片組內；軟件（固件）部分一般與 BIOS 共存在一個 ROM 芯片中（如果把 ROM 的內容提取出來的話，會發現 ME 固件往往比 BIOS 本身以及 GBE 固件加在一起還大）。</a:t>
+            </a:r>
+            <a:endParaRPr lang="en-US"/>
+          </a:p>
+          <a:p>
+            <a:pPr lvl="1"/>
+            <a:r>
+              <a:rPr lang="en-US"/>
+              <a:t>在 Linux 平臺上可以使用 intelmetool 來查看 ME 的狀態。</a:t>
+            </a:r>
+            <a:endParaRPr lang="en-US"/>
+          </a:p>
+        </p:txBody>
+      </p:sp>
+    </p:spTree>
+  </p:cSld>
+  <p:clrMapOvr>
+    <a:masterClrMapping/>
+  </p:clrMapOvr>
+</p:sld>
+</file>
+
+<file path=ppt/slides/slide12.xml><?xml version="1.0" encoding="utf-8"?>
+<p:sld xmlns:a="http://schemas.openxmlformats.org/drawingml/2006/main" xmlns:r="http://schemas.openxmlformats.org/officeDocument/2006/relationships" xmlns:p="http://schemas.openxmlformats.org/presentationml/2006/main">
+  <p:cSld>
+    <p:spTree>
+      <p:nvGrpSpPr>
+        <p:cNvPr id="1" name=""/>
+        <p:cNvGrpSpPr/>
+        <p:nvPr/>
+      </p:nvGrpSpPr>
+      <p:grpSpPr/>
+      <p:sp>
+        <p:nvSpPr>
+          <p:cNvPr id="2" name="Title 1"/>
+          <p:cNvSpPr>
+            <a:spLocks noGrp="1"/>
+          </p:cNvSpPr>
+          <p:nvPr>
+            <p:ph type="title"/>
+          </p:nvPr>
+        </p:nvSpPr>
+        <p:spPr>
+          <a:xfrm>
+            <a:off x="838200" y="193675"/>
+            <a:ext cx="10515600" cy="934720"/>
+          </a:xfrm>
+        </p:spPr>
+        <p:txBody>
+          <a:bodyPr>
+            <a:normAutofit fontScale="90000"/>
+          </a:bodyPr>
+          <a:p>
+            <a:r>
+              <a:rPr lang="en-US"/>
+              <a:t>使用coreboot </a:t>
+            </a:r>
+            <a:r>
+              <a:rPr lang="x-none" altLang="en-US"/>
+              <a:t>(1/6)</a:t>
+            </a:r>
+            <a:br>
+              <a:rPr lang="en-US"/>
+            </a:br>
+            <a:r>
+              <a:rPr lang="en-US" sz="2400"/>
+              <a:t>https://v2bv.net/2018/coreboot</a:t>
+            </a:r>
+            <a:endParaRPr lang="en-US" sz="2400"/>
+          </a:p>
+        </p:txBody>
+      </p:sp>
+      <p:sp>
+        <p:nvSpPr>
+          <p:cNvPr id="3" name="Content Placeholder 2"/>
+          <p:cNvSpPr>
+            <a:spLocks noGrp="1"/>
+          </p:cNvSpPr>
+          <p:nvPr>
+            <p:ph idx="1"/>
+          </p:nvPr>
+        </p:nvSpPr>
+        <p:spPr>
+          <a:xfrm>
+            <a:off x="838200" y="1151255"/>
+            <a:ext cx="10515600" cy="5619750"/>
+          </a:xfrm>
+        </p:spPr>
+        <p:txBody>
+          <a:bodyPr>
+            <a:normAutofit fontScale="50000"/>
+          </a:bodyPr>
+          <a:p>
+            <a:r>
+              <a:rPr lang="en-US"/>
+              <a:t>編譯 coreboot 的依賴裝好</a:t>
+            </a:r>
+            <a:r>
+              <a:rPr lang="x-none" altLang="en-US"/>
+              <a:t>,gcc,gnat,bison,flex,ncurses,wget,zlib</a:t>
+            </a:r>
+            <a:endParaRPr lang="x-none" altLang="en-US"/>
+          </a:p>
+          <a:p>
+            <a:r>
+              <a:rPr lang="x-none" altLang="en-US"/>
+              <a:t>coreboot 的源碼拖下來:</a:t>
+            </a:r>
+            <a:endParaRPr lang="x-none" altLang="en-US"/>
+          </a:p>
+          <a:p>
+            <a:pPr lvl="1"/>
+            <a:r>
+              <a:rPr lang="x-none" altLang="en-US"/>
+              <a:t>$ git clone https://review.coreboot.org/coreboot.git </a:t>
+            </a:r>
+            <a:endParaRPr lang="x-none" altLang="en-US"/>
+          </a:p>
+          <a:p>
+            <a:pPr lvl="1"/>
+            <a:r>
+              <a:rPr lang="x-none" altLang="en-US"/>
+              <a:t>$ cd coreboot &amp;&amp; git submodule update --init --checkout </a:t>
+            </a:r>
+            <a:endParaRPr lang="x-none" altLang="en-US"/>
+          </a:p>
+          <a:p>
+            <a:pPr lvl="1"/>
+            <a:r>
+              <a:rPr lang="x-none" altLang="en-US"/>
+              <a:t>$ git clone https://review.coreboot.org/flashrom.git</a:t>
+            </a:r>
+            <a:endParaRPr lang="x-none" altLang="en-US"/>
+          </a:p>
+          <a:p>
+            <a:r>
+              <a:rPr lang="x-none" altLang="en-US"/>
+              <a:t>進入 coreboot 的源碼目錄裏，準備好工具鏈等等：</a:t>
+            </a:r>
+            <a:endParaRPr lang="x-none" altLang="en-US"/>
+          </a:p>
+          <a:p>
+            <a:pPr lvl="1"/>
+            <a:r>
+              <a:rPr lang="x-none" altLang="en-US"/>
+              <a:t>$ make crossgcc-i386 CPUS=4 # 這裏只需要給 X220 用，所以準備 i386 的工具鏈就足夠了</a:t>
+            </a:r>
+            <a:endParaRPr lang="x-none" altLang="en-US"/>
+          </a:p>
+          <a:p>
+            <a:pPr lvl="1"/>
+            <a:r>
+              <a:rPr lang="x-none" altLang="en-US"/>
+              <a:t>$ make iasl # 準備 iASL 編譯器</a:t>
+            </a:r>
+            <a:endParaRPr lang="x-none" altLang="en-US"/>
+          </a:p>
+          <a:p>
+            <a:r>
+              <a:rPr lang="x-none" altLang="en-US"/>
+              <a:t>用 flashrom 把現有的固件 Dump 出來：</a:t>
+            </a:r>
+            <a:endParaRPr lang="x-none" altLang="en-US"/>
+          </a:p>
+          <a:p>
+            <a:pPr lvl="1"/>
+            <a:r>
+              <a:rPr lang="x-none" altLang="en-US"/>
+              <a:t>$ sudo flashrom -p internal:laptop=force_I_want_a_brick -c MX25L6405D -r dump.rom # 這裏舉例用的是 internal flash 的命令，如果用編程器的話需要根據編程器進行修改。</a:t>
+            </a:r>
+            <a:endParaRPr lang="x-none" altLang="en-US"/>
+          </a:p>
+          <a:p>
+            <a:pPr lvl="0"/>
+            <a:r>
+              <a:rPr lang="x-none" altLang="en-US"/>
+              <a:t>進入 coreboot 源碼目錄的 util/ifdtool 目錄下並編譯它：</a:t>
+            </a:r>
+            <a:endParaRPr lang="x-none" altLang="en-US"/>
+          </a:p>
+          <a:p>
+            <a:pPr lvl="1"/>
+            <a:r>
+              <a:rPr lang="x-none" altLang="en-US"/>
+              <a:t>$ cd util/ifdtool &amp;&amp; make</a:t>
+            </a:r>
+            <a:endParaRPr lang="x-none" altLang="en-US"/>
+          </a:p>
+          <a:p>
+            <a:r>
+              <a:rPr lang="x-none" altLang="en-US"/>
+              <a:t>使用 ifdtool 解鎖固件描述（firmware descriptor）和 ME 區域。</a:t>
+            </a:r>
+            <a:endParaRPr lang="x-none" altLang="en-US"/>
+          </a:p>
+          <a:p>
+            <a:pPr lvl="1"/>
+            <a:r>
+              <a:rPr lang="x-none" altLang="en-US"/>
+              <a:t>$ ifdtool -u dump.rom # 把文件名改成自己的, ifdtool 會創建一個新的 dump.rom.new，接下來的步驟要用它。</a:t>
+            </a:r>
+            <a:endParaRPr lang="x-none" altLang="en-US"/>
+          </a:p>
+          <a:p>
+            <a:pPr lvl="0"/>
+            <a:r>
+              <a:rPr lang="x-none" altLang="en-US"/>
+              <a:t>想幹掉 ME 的話現在拿去過一邊 me_cleaner 應該就可以刷回去了。</a:t>
+            </a:r>
+            <a:endParaRPr lang="x-none" altLang="en-US"/>
+          </a:p>
+          <a:p>
+            <a:pPr lvl="1"/>
+            <a:r>
+              <a:rPr lang="x-none" altLang="en-US"/>
+              <a:t>$ me_claner.py dump.rom.new # 換成你自己的文件名</a:t>
+            </a:r>
+            <a:endParaRPr lang="x-none" altLang="en-US"/>
+          </a:p>
+          <a:p>
+            <a:pPr lvl="0"/>
+            <a:r>
+              <a:rPr lang="x-none" altLang="en-US"/>
+              <a:t>進入 flashrom 源碼目錄下的 util/ich_descriptors_tool 目錄並編譯 ich_descriptors_tool</a:t>
+            </a:r>
+            <a:endParaRPr lang="x-none" altLang="en-US"/>
+          </a:p>
+          <a:p>
+            <a:pPr lvl="1"/>
+            <a:r>
+              <a:rPr lang="x-none" altLang="en-US"/>
+              <a:t>$ cd util/ich_descriptors_tool &amp;&amp; make</a:t>
+            </a:r>
+            <a:endParaRPr lang="x-none" altLang="en-US"/>
+          </a:p>
+        </p:txBody>
+      </p:sp>
+    </p:spTree>
+  </p:cSld>
+  <p:clrMapOvr>
+    <a:masterClrMapping/>
+  </p:clrMapOvr>
+</p:sld>
+</file>
+
+<file path=ppt/slides/slide13.xml><?xml version="1.0" encoding="utf-8"?>
+<p:sld xmlns:a="http://schemas.openxmlformats.org/drawingml/2006/main" xmlns:r="http://schemas.openxmlformats.org/officeDocument/2006/relationships" xmlns:p="http://schemas.openxmlformats.org/presentationml/2006/main">
+  <p:cSld>
+    <p:spTree>
+      <p:nvGrpSpPr>
+        <p:cNvPr id="1" name=""/>
+        <p:cNvGrpSpPr/>
+        <p:nvPr/>
+      </p:nvGrpSpPr>
+      <p:grpSpPr/>
+      <p:sp>
+        <p:nvSpPr>
+          <p:cNvPr id="2" name="Title 1"/>
+          <p:cNvSpPr>
+            <a:spLocks noGrp="1"/>
+          </p:cNvSpPr>
+          <p:nvPr>
+            <p:ph type="title"/>
+          </p:nvPr>
+        </p:nvSpPr>
+        <p:spPr>
+          <a:xfrm>
+            <a:off x="838200" y="193675"/>
+            <a:ext cx="10515600" cy="934720"/>
+          </a:xfrm>
+        </p:spPr>
+        <p:txBody>
+          <a:bodyPr>
+            <a:normAutofit fontScale="90000"/>
+          </a:bodyPr>
+          <a:p>
+            <a:r>
+              <a:rPr lang="en-US"/>
+              <a:t>使用coreboot </a:t>
+            </a:r>
+            <a:r>
+              <a:rPr lang="x-none" altLang="en-US"/>
+              <a:t>(2/6)</a:t>
+            </a:r>
+            <a:br>
+              <a:rPr lang="en-US"/>
+            </a:br>
+            <a:r>
+              <a:rPr lang="en-US" sz="2400"/>
+              <a:t>https://v2bv.net/2018/coreboot</a:t>
+            </a:r>
+            <a:endParaRPr lang="en-US" sz="2400"/>
+          </a:p>
+        </p:txBody>
+      </p:sp>
+      <p:sp>
+        <p:nvSpPr>
+          <p:cNvPr id="3" name="Content Placeholder 2"/>
+          <p:cNvSpPr>
+            <a:spLocks noGrp="1"/>
+          </p:cNvSpPr>
+          <p:nvPr>
+            <p:ph idx="1"/>
+          </p:nvPr>
+        </p:nvSpPr>
+        <p:spPr>
+          <a:xfrm>
+            <a:off x="838200" y="1151255"/>
+            <a:ext cx="10515600" cy="5619750"/>
+          </a:xfrm>
+        </p:spPr>
+        <p:txBody>
+          <a:bodyPr>
+            <a:normAutofit/>
+          </a:bodyPr>
+          <a:p>
+            <a:r>
+              <a:t>然後用它來提取文件：</a:t>
+            </a:r>
+          </a:p>
+          <a:p>
+            <a:pPr lvl="1"/>
+            <a:r>
+              <a:rPr lang="x-none" altLang="en-US"/>
+              <a:t>$ ich_descriptors_tool -f dump.rom.new -d # 當然，還是要改成自己的文件名. 這個工具會輸出一大堆東西，我們只要它創建的 dump.rom.new.Descriptor.bin、dump.rom.new.ME.bin 和 dump.rom.new.GBE.bin,分別代表着需要用到的三大坨 blob。</a:t>
+            </a:r>
+            <a:endParaRPr lang="x-none" altLang="en-US"/>
+          </a:p>
+          <a:p>
+            <a:pPr lvl="0"/>
+            <a:r>
+              <a:rPr lang="x-none" altLang="en-US"/>
+              <a:t>然後我們可以把這些文件複製到 coreboot 源碼目錄的 3rdparty/blobs 目錄的對應位置裏（這是爲了之後配置起來方便點）。</a:t>
+            </a:r>
+            <a:endParaRPr lang="x-none" altLang="en-US"/>
+          </a:p>
+          <a:p>
+            <a:pPr lvl="1"/>
+            <a:r>
+              <a:rPr lang="x-none" altLang="en-US"/>
+              <a:t>$ cp dump.rom.new.Descriptor.bin ~/coreboot/3rdparty/blobs/mainboard/lenovo/x220/descriptor.bin</a:t>
+            </a:r>
+            <a:endParaRPr lang="x-none" altLang="en-US"/>
+          </a:p>
+          <a:p>
+            <a:pPr lvl="1"/>
+            <a:r>
+              <a:rPr lang="x-none" altLang="en-US"/>
+              <a:t>$ cp dump.rom.new.ME.bin ~/coreboot/3rdparty/blobs/mainboard/lenovo/x220/me.bin</a:t>
+            </a:r>
+            <a:endParaRPr lang="x-none" altLang="en-US"/>
+          </a:p>
+          <a:p>
+            <a:pPr lvl="1"/>
+            <a:r>
+              <a:rPr lang="x-none" altLang="en-US"/>
+              <a:t>$ cp dump.rom.new.GBE.bin ~/coreboot/3rdparty/blobs/mainboard/lenovo/x220/gbe.bin</a:t>
+            </a:r>
+            <a:endParaRPr lang="x-none" altLang="en-US"/>
+          </a:p>
+          <a:p>
+            <a:pPr lvl="0"/>
+            <a:endParaRPr lang="x-none" altLang="en-US"/>
+          </a:p>
+        </p:txBody>
+      </p:sp>
+    </p:spTree>
+  </p:cSld>
+  <p:clrMapOvr>
+    <a:masterClrMapping/>
+  </p:clrMapOvr>
+</p:sld>
+</file>
+
+<file path=ppt/slides/slide14.xml><?xml version="1.0" encoding="utf-8"?>
+<p:sld xmlns:a="http://schemas.openxmlformats.org/drawingml/2006/main" xmlns:r="http://schemas.openxmlformats.org/officeDocument/2006/relationships" xmlns:p="http://schemas.openxmlformats.org/presentationml/2006/main">
+  <p:cSld>
+    <p:spTree>
+      <p:nvGrpSpPr>
+        <p:cNvPr id="1" name=""/>
+        <p:cNvGrpSpPr/>
+        <p:nvPr/>
+      </p:nvGrpSpPr>
+      <p:grpSpPr/>
+      <p:sp>
+        <p:nvSpPr>
+          <p:cNvPr id="2" name="Title 1"/>
+          <p:cNvSpPr>
+            <a:spLocks noGrp="1"/>
+          </p:cNvSpPr>
+          <p:nvPr>
+            <p:ph type="title"/>
+          </p:nvPr>
+        </p:nvSpPr>
+        <p:spPr>
+          <a:xfrm>
+            <a:off x="838200" y="193675"/>
+            <a:ext cx="10515600" cy="934720"/>
+          </a:xfrm>
+        </p:spPr>
+        <p:txBody>
+          <a:bodyPr>
+            <a:normAutofit fontScale="90000"/>
+          </a:bodyPr>
+          <a:p>
+            <a:r>
+              <a:rPr lang="en-US"/>
+              <a:t>使用coreboot </a:t>
+            </a:r>
+            <a:r>
+              <a:rPr lang="x-none" altLang="en-US"/>
+              <a:t>(3/6)</a:t>
+            </a:r>
+            <a:br>
+              <a:rPr lang="en-US"/>
+            </a:br>
+            <a:r>
+              <a:rPr lang="en-US" sz="2400"/>
+              <a:t>https://v2bv.net/2018/coreboot</a:t>
+            </a:r>
+            <a:endParaRPr lang="en-US" sz="2400"/>
+          </a:p>
+        </p:txBody>
+      </p:sp>
+      <p:sp>
+        <p:nvSpPr>
+          <p:cNvPr id="3" name="Content Placeholder 2"/>
+          <p:cNvSpPr>
+            <a:spLocks noGrp="1"/>
+          </p:cNvSpPr>
+          <p:nvPr>
+            <p:ph idx="1"/>
+          </p:nvPr>
+        </p:nvSpPr>
+        <p:spPr>
+          <a:xfrm>
+            <a:off x="839470" y="1151255"/>
+            <a:ext cx="6348095" cy="5619750"/>
+          </a:xfrm>
+        </p:spPr>
+        <p:txBody>
+          <a:bodyPr>
+            <a:normAutofit fontScale="80000"/>
+          </a:bodyPr>
+          <a:p>
+            <a:pPr lvl="0"/>
+            <a:r>
+              <a:rPr lang="x-none" altLang="en-US"/>
+              <a:t>接下來就是配置 coreboot, 回到 coreboot 的源碼目錄下執行 make menuconfig 開始配置。</a:t>
+            </a:r>
+            <a:endParaRPr lang="x-none" altLang="en-US"/>
+          </a:p>
+          <a:p>
+            <a:pPr lvl="0"/>
+            <a:r>
+              <a:rPr lang="x-none" altLang="en-US"/>
+              <a:t>進入第一個 General setup，</a:t>
+            </a:r>
+            <a:endParaRPr lang="x-none" altLang="en-US"/>
+          </a:p>
+          <a:p>
+            <a:pPr lvl="1"/>
+            <a:r>
+              <a:rPr lang="x-none" altLang="en-US"/>
+              <a:t>[*] Generate flashmap descriptor parser using flex and bison</a:t>
+            </a:r>
+            <a:endParaRPr lang="x-none" altLang="en-US"/>
+          </a:p>
+          <a:p>
+            <a:pPr lvl="1"/>
+            <a:r>
+              <a:rPr lang="x-none" altLang="en-US"/>
+              <a:t>[*] Generate SCONFIG &amp; BLOBTOOL parser using flex and bison</a:t>
+            </a:r>
+            <a:endParaRPr lang="x-none" altLang="en-US"/>
+          </a:p>
+          <a:p>
+            <a:pPr lvl="1"/>
+            <a:r>
+              <a:rPr lang="x-none" altLang="en-US"/>
+              <a:t>[*] Use CMOS for configuration values</a:t>
+            </a:r>
+            <a:endParaRPr lang="x-none" altLang="en-US"/>
+          </a:p>
+          <a:p>
+            <a:pPr lvl="1"/>
+            <a:r>
+              <a:rPr lang="x-none" altLang="en-US"/>
+              <a:t>[*] Compress ramstage with LZMA</a:t>
+            </a:r>
+            <a:endParaRPr lang="x-none" altLang="en-US"/>
+          </a:p>
+          <a:p>
+            <a:pPr lvl="1"/>
+            <a:r>
+              <a:rPr lang="x-none" altLang="en-US"/>
+              <a:t>[*] Include the coreboot .config file into the ROM image</a:t>
+            </a:r>
+            <a:endParaRPr lang="x-none" altLang="en-US"/>
+          </a:p>
+          <a:p>
+            <a:pPr lvl="1"/>
+            <a:r>
+              <a:rPr lang="x-none" altLang="en-US"/>
+              <a:t>[*] Create a table of timestamps collected during boot</a:t>
+            </a:r>
+            <a:endParaRPr lang="x-none" altLang="en-US"/>
+          </a:p>
+          <a:p>
+            <a:pPr lvl="1"/>
+            <a:r>
+              <a:rPr lang="x-none" altLang="en-US"/>
+              <a:t>[*] Allow use of binary-only repository # 這條一定要打開</a:t>
+            </a:r>
+            <a:endParaRPr lang="x-none" altLang="en-US"/>
+          </a:p>
+          <a:p>
+            <a:pPr lvl="1"/>
+            <a:r>
+              <a:rPr lang="x-none" altLang="en-US"/>
+              <a:t>-*- Build the ramstage to be relocatable in 32-bit address space.</a:t>
+            </a:r>
+            <a:endParaRPr lang="x-none" altLang="en-US"/>
+          </a:p>
+          <a:p>
+            <a:pPr lvl="1"/>
+            <a:endParaRPr lang="x-none" altLang="en-US"/>
+          </a:p>
+        </p:txBody>
+      </p:sp>
+      <p:pic>
+        <p:nvPicPr>
+          <p:cNvPr id="4" name="Picture 3"/>
+          <p:cNvPicPr>
+            <a:picLocks noChangeAspect="1"/>
+          </p:cNvPicPr>
+          <p:nvPr/>
+        </p:nvPicPr>
+        <p:blipFill>
+          <a:blip r:embed="rId1"/>
+          <a:stretch>
+            <a:fillRect/>
+          </a:stretch>
+        </p:blipFill>
+        <p:spPr>
+          <a:xfrm>
+            <a:off x="7720330" y="1189355"/>
+            <a:ext cx="4046855" cy="3627755"/>
+          </a:xfrm>
+          <a:prstGeom prst="rect">
+            <a:avLst/>
+          </a:prstGeom>
+        </p:spPr>
+      </p:pic>
+    </p:spTree>
+  </p:cSld>
+  <p:clrMapOvr>
+    <a:masterClrMapping/>
+  </p:clrMapOvr>
+</p:sld>
+</file>
+
+<file path=ppt/slides/slide15.xml><?xml version="1.0" encoding="utf-8"?>
+<p:sld xmlns:a="http://schemas.openxmlformats.org/drawingml/2006/main" xmlns:r="http://schemas.openxmlformats.org/officeDocument/2006/relationships" xmlns:p="http://schemas.openxmlformats.org/presentationml/2006/main">
+  <p:cSld>
+    <p:spTree>
+      <p:nvGrpSpPr>
+        <p:cNvPr id="1" name=""/>
+        <p:cNvGrpSpPr/>
+        <p:nvPr/>
+      </p:nvGrpSpPr>
+      <p:grpSpPr/>
+      <p:sp>
+        <p:nvSpPr>
+          <p:cNvPr id="2" name="Title 1"/>
+          <p:cNvSpPr>
+            <a:spLocks noGrp="1"/>
+          </p:cNvSpPr>
+          <p:nvPr>
+            <p:ph type="title"/>
+          </p:nvPr>
+        </p:nvSpPr>
+        <p:spPr>
+          <a:xfrm>
+            <a:off x="838200" y="193675"/>
+            <a:ext cx="10515600" cy="934720"/>
+          </a:xfrm>
+        </p:spPr>
+        <p:txBody>
+          <a:bodyPr>
+            <a:normAutofit fontScale="90000"/>
+          </a:bodyPr>
+          <a:p>
+            <a:r>
+              <a:rPr lang="en-US"/>
+              <a:t>使用coreboot </a:t>
+            </a:r>
+            <a:r>
+              <a:rPr lang="x-none" altLang="en-US"/>
+              <a:t>(4/6)</a:t>
+            </a:r>
+            <a:br>
+              <a:rPr lang="en-US"/>
+            </a:br>
+            <a:r>
+              <a:rPr lang="en-US" sz="2400"/>
+              <a:t>https://v2bv.net/2018/coreboot</a:t>
+            </a:r>
+            <a:endParaRPr lang="en-US" sz="2400"/>
+          </a:p>
+        </p:txBody>
+      </p:sp>
+      <p:sp>
+        <p:nvSpPr>
+          <p:cNvPr id="3" name="Content Placeholder 2"/>
+          <p:cNvSpPr>
+            <a:spLocks noGrp="1"/>
+          </p:cNvSpPr>
+          <p:nvPr>
+            <p:ph idx="1"/>
+          </p:nvPr>
+        </p:nvSpPr>
+        <p:spPr>
+          <a:xfrm>
+            <a:off x="840105" y="1151255"/>
+            <a:ext cx="11002645" cy="5619750"/>
+          </a:xfrm>
+        </p:spPr>
+        <p:txBody>
+          <a:bodyPr>
+            <a:normAutofit fontScale="50000"/>
+          </a:bodyPr>
+          <a:p>
+            <a:pPr lvl="0"/>
+            <a:r>
+              <a:rPr lang="x-none" altLang="en-US"/>
+              <a:t>之後是 Mainboard，</a:t>
+            </a:r>
+            <a:endParaRPr lang="x-none" altLang="en-US"/>
+          </a:p>
+          <a:p>
+            <a:pPr lvl="1"/>
+            <a:r>
+              <a:rPr lang="x-none" altLang="en-US"/>
+              <a:t>    *** Important: Run 'make distclean' before switching boards ***                                                                                                           </a:t>
+            </a:r>
+            <a:endParaRPr lang="x-none" altLang="en-US"/>
+          </a:p>
+          <a:p>
+            <a:pPr lvl="1"/>
+            <a:r>
+              <a:rPr lang="x-none" altLang="en-US"/>
+              <a:t>    Mainboard vendor (Lenovo)  ---&gt; # 選聯想</a:t>
+            </a:r>
+            <a:endParaRPr lang="x-none" altLang="en-US"/>
+          </a:p>
+          <a:p>
+            <a:pPr lvl="1"/>
+            <a:r>
+              <a:rPr lang="x-none" altLang="en-US"/>
+              <a:t>    Mainboard model (ThinkPad X220)  ---&gt; # 當然是 X220 啦</a:t>
+            </a:r>
+            <a:endParaRPr lang="x-none" altLang="en-US"/>
+          </a:p>
+          <a:p>
+            <a:pPr lvl="1"/>
+            <a:r>
+              <a:rPr lang="x-none" altLang="en-US"/>
+              <a:t>    ROM chip size (8192 KB (8 MB))  ---&gt; # 除非你魔改過，不然不用改</a:t>
+            </a:r>
+            <a:endParaRPr lang="x-none" altLang="en-US"/>
+          </a:p>
+          <a:p>
+            <a:pPr lvl="1"/>
+            <a:r>
+              <a:rPr lang="x-none" altLang="en-US"/>
+              <a:t>(0x100000) Size of CBFS filesystem in ROM</a:t>
+            </a:r>
+            <a:endParaRPr lang="x-none" altLang="en-US"/>
+          </a:p>
+          <a:p>
+            <a:pPr lvl="1"/>
+            <a:r>
+              <a:rPr lang="x-none" altLang="en-US"/>
+              <a:t>()  fmap description file in fmd format</a:t>
+            </a:r>
+            <a:endParaRPr lang="x-none" altLang="en-US"/>
+          </a:p>
+          <a:p>
+            <a:pPr lvl="0"/>
+            <a:r>
+              <a:rPr lang="x-none" altLang="en-US"/>
+              <a:t>然後 Chipset：</a:t>
+            </a:r>
+            <a:endParaRPr lang="x-none" altLang="en-US"/>
+          </a:p>
+          <a:p>
+            <a:pPr lvl="1"/>
+            <a:r>
+              <a:rPr lang="x-none" altLang="en-US"/>
+              <a:t>[*] Enable VMX for virtualization</a:t>
+            </a:r>
+            <a:endParaRPr lang="x-none" altLang="en-US"/>
+          </a:p>
+          <a:p>
+            <a:pPr lvl="1"/>
+            <a:r>
+              <a:rPr lang="x-none" altLang="en-US"/>
+              <a:t>[*]   Set lock bit after configuring VMX</a:t>
+            </a:r>
+            <a:endParaRPr lang="x-none" altLang="en-US"/>
+          </a:p>
+          <a:p>
+            <a:pPr lvl="1"/>
+            <a:r>
+              <a:rPr lang="x-none" altLang="en-US"/>
+              <a:t>-*- Use native raminit</a:t>
+            </a:r>
+            <a:endParaRPr lang="x-none" altLang="en-US"/>
+          </a:p>
+          <a:p>
+            <a:pPr lvl="1"/>
+            <a:r>
+              <a:rPr lang="x-none" altLang="en-US"/>
+              <a:t>[*] Beep on fatal error</a:t>
+            </a:r>
+            <a:endParaRPr lang="x-none" altLang="en-US"/>
+          </a:p>
+          <a:p>
+            <a:pPr lvl="1"/>
+            <a:r>
+              <a:rPr lang="x-none" altLang="en-US"/>
+              <a:t>[*] Flash LEDs on fatal error</a:t>
+            </a:r>
+            <a:endParaRPr lang="x-none" altLang="en-US"/>
+          </a:p>
+          <a:p>
+            <a:pPr lvl="1"/>
+            <a:r>
+              <a:rPr lang="x-none" altLang="en-US"/>
+              <a:t>[*] Support bluetooth on wifi cards</a:t>
+            </a:r>
+            <a:endParaRPr lang="x-none" altLang="en-US"/>
+          </a:p>
+          <a:p>
+            <a:pPr lvl="1"/>
+            <a:r>
+              <a:rPr lang="x-none" altLang="en-US"/>
+              <a:t>    *** Intel Firmware ***</a:t>
+            </a:r>
+            <a:endParaRPr lang="x-none" altLang="en-US"/>
+          </a:p>
+          <a:p>
+            <a:pPr lvl="1"/>
+            <a:r>
+              <a:rPr lang="x-none" altLang="en-US"/>
+              <a:t>[*] Add Intel descriptor.bin file # 必選</a:t>
+            </a:r>
+            <a:endParaRPr lang="x-none" altLang="en-US"/>
+          </a:p>
+          <a:p>
+            <a:pPr lvl="1"/>
+            <a:r>
+              <a:rPr lang="x-none" altLang="en-US"/>
+              <a:t>[*]   Add Intel ME/TXE firmware # 必選</a:t>
+            </a:r>
+            <a:endParaRPr lang="x-none" altLang="en-US"/>
+          </a:p>
+          <a:p>
+            <a:pPr lvl="1"/>
+            <a:r>
+              <a:rPr lang="x-none" altLang="en-US"/>
+              <a:t>(3rdparty/blobs/mainboard/$(MAINBOARDDIR)/me.bin) Path to management engine firmware # 同上</a:t>
+            </a:r>
+            <a:endParaRPr lang="x-none" altLang="en-US"/>
+          </a:p>
+          <a:p>
+            <a:pPr lvl="1"/>
+            <a:r>
+              <a:rPr lang="x-none" altLang="en-US"/>
+              <a:t>[*]     Verify the integrity of the supplied ME/TXE firmware</a:t>
+            </a:r>
+            <a:endParaRPr lang="x-none" altLang="en-US"/>
+          </a:p>
+          <a:p>
+            <a:pPr lvl="1"/>
+            <a:r>
+              <a:rPr lang="x-none" altLang="en-US"/>
+              <a:t>[*]     Strip down the Intel ME/TXE firmware # 如果要幹 ME 的話選上這個</a:t>
+            </a:r>
+            <a:endParaRPr lang="x-none" altLang="en-US"/>
+          </a:p>
+          <a:p>
+            <a:pPr lvl="1"/>
+            <a:r>
+              <a:rPr lang="x-none" altLang="en-US"/>
+              <a:t>          *** Please test the modified ME/TXE firmware and coreboot in two steps ***</a:t>
+            </a:r>
+            <a:endParaRPr lang="x-none" altLang="en-US"/>
+          </a:p>
+          <a:p>
+            <a:pPr lvl="1"/>
+            <a:r>
+              <a:rPr lang="x-none" altLang="en-US"/>
+              <a:t>[*]   Add gigabit ethernet firmware # 必選</a:t>
+            </a:r>
+            <a:endParaRPr lang="x-none" altLang="en-US"/>
+          </a:p>
+        </p:txBody>
+      </p:sp>
+    </p:spTree>
+  </p:cSld>
+  <p:clrMapOvr>
+    <a:masterClrMapping/>
+  </p:clrMapOvr>
+</p:sld>
+</file>
+
+<file path=ppt/slides/slide16.xml><?xml version="1.0" encoding="utf-8"?>
+<p:sld xmlns:a="http://schemas.openxmlformats.org/drawingml/2006/main" xmlns:r="http://schemas.openxmlformats.org/officeDocument/2006/relationships" xmlns:p="http://schemas.openxmlformats.org/presentationml/2006/main">
+  <p:cSld>
+    <p:spTree>
+      <p:nvGrpSpPr>
+        <p:cNvPr id="1" name=""/>
+        <p:cNvGrpSpPr/>
+        <p:nvPr/>
+      </p:nvGrpSpPr>
+      <p:grpSpPr/>
+      <p:sp>
+        <p:nvSpPr>
+          <p:cNvPr id="2" name="Title 1"/>
+          <p:cNvSpPr>
+            <a:spLocks noGrp="1"/>
+          </p:cNvSpPr>
+          <p:nvPr>
+            <p:ph type="title"/>
+          </p:nvPr>
+        </p:nvSpPr>
+        <p:spPr>
+          <a:xfrm>
+            <a:off x="838200" y="193675"/>
+            <a:ext cx="10515600" cy="934720"/>
+          </a:xfrm>
+        </p:spPr>
+        <p:txBody>
+          <a:bodyPr>
+            <a:normAutofit fontScale="90000"/>
+          </a:bodyPr>
+          <a:p>
+            <a:r>
+              <a:rPr lang="en-US"/>
+              <a:t>使用coreboot </a:t>
+            </a:r>
+            <a:r>
+              <a:rPr lang="x-none" altLang="en-US"/>
+              <a:t>(5/6)</a:t>
+            </a:r>
+            <a:br>
+              <a:rPr lang="en-US"/>
+            </a:br>
+            <a:r>
+              <a:rPr lang="en-US" sz="2400"/>
+              <a:t>https://v2bv.net/2018/coreboot</a:t>
+            </a:r>
+            <a:endParaRPr lang="en-US" sz="2400"/>
+          </a:p>
+        </p:txBody>
+      </p:sp>
+      <p:sp>
+        <p:nvSpPr>
+          <p:cNvPr id="3" name="Content Placeholder 2"/>
+          <p:cNvSpPr>
+            <a:spLocks noGrp="1"/>
+          </p:cNvSpPr>
+          <p:nvPr>
+            <p:ph idx="1"/>
+          </p:nvPr>
+        </p:nvSpPr>
+        <p:spPr>
+          <a:xfrm>
+            <a:off x="840105" y="1151255"/>
+            <a:ext cx="5212080" cy="5619750"/>
+          </a:xfrm>
+        </p:spPr>
+        <p:txBody>
+          <a:bodyPr>
+            <a:normAutofit fontScale="60000"/>
+          </a:bodyPr>
+          <a:p>
+            <a:pPr lvl="0"/>
+            <a:r>
+              <a:rPr lang="x-none" altLang="en-US"/>
+              <a:t>Devices 裏：</a:t>
+            </a:r>
+            <a:endParaRPr lang="x-none" altLang="en-US"/>
+          </a:p>
+          <a:p>
+            <a:pPr lvl="1"/>
+            <a:r>
+              <a:rPr lang="x-none" altLang="en-US"/>
+              <a:t>-*- Enable PCIe Common Clock</a:t>
+            </a:r>
+            <a:endParaRPr lang="x-none" altLang="en-US"/>
+          </a:p>
+          <a:p>
+            <a:pPr lvl="1"/>
+            <a:r>
+              <a:rPr lang="x-none" altLang="en-US"/>
+              <a:t>-*- Enable PCIe ASPM</a:t>
+            </a:r>
+            <a:endParaRPr lang="x-none" altLang="en-US"/>
+          </a:p>
+          <a:p>
+            <a:pPr lvl="1"/>
+            <a:r>
+              <a:rPr lang="x-none" altLang="en-US"/>
+              <a:t>[*] Enable PCIe Clock Power Management</a:t>
+            </a:r>
+            <a:endParaRPr lang="x-none" altLang="en-US"/>
+          </a:p>
+          <a:p>
+            <a:pPr lvl="1"/>
+            <a:r>
+              <a:rPr lang="x-none" altLang="en-US"/>
+              <a:t>[*] Enable PCIe ASPM L1 SubState</a:t>
+            </a:r>
+            <a:endParaRPr lang="x-none" altLang="en-US"/>
+          </a:p>
+          <a:p>
+            <a:pPr lvl="1"/>
+            <a:r>
+              <a:rPr lang="x-none" altLang="en-US"/>
+              <a:t>[*] Enable I2C controller emulation in software</a:t>
+            </a:r>
+            <a:endParaRPr lang="x-none" altLang="en-US"/>
+          </a:p>
+          <a:p>
+            <a:pPr lvl="0"/>
+            <a:r>
+              <a:rPr lang="x-none" altLang="en-US"/>
+              <a:t>Generic Drivers 裏基本不需要動:</a:t>
+            </a:r>
+            <a:endParaRPr lang="x-none" altLang="en-US"/>
+          </a:p>
+          <a:p>
+            <a:pPr lvl="1"/>
+            <a:r>
+              <a:rPr lang="x-none" altLang="en-US"/>
+              <a:t>[*] SPI flash driver support in SMM</a:t>
+            </a:r>
+            <a:endParaRPr lang="x-none" altLang="en-US"/>
+          </a:p>
+          <a:p>
+            <a:pPr lvl="1"/>
+            <a:r>
+              <a:rPr lang="x-none" altLang="en-US"/>
+              <a:t>[*] Support Intel PCI-e WiFi adapters</a:t>
+            </a:r>
+            <a:endParaRPr lang="x-none" altLang="en-US"/>
+          </a:p>
+          <a:p>
+            <a:pPr lvl="1"/>
+            <a:r>
+              <a:rPr lang="x-none" altLang="en-US"/>
+              <a:t>[*] PS/2 keyboard init # 必選</a:t>
+            </a:r>
+            <a:endParaRPr lang="x-none" altLang="en-US"/>
+          </a:p>
+          <a:p>
+            <a:pPr lvl="1"/>
+            <a:r>
+              <a:rPr lang="x-none" altLang="en-US"/>
+              <a:t>[*] Enable TPM support # 如果需要 TPM 的話可以選上</a:t>
+            </a:r>
+            <a:endParaRPr lang="x-none" altLang="en-US"/>
+          </a:p>
+          <a:p>
+            <a:pPr lvl="0"/>
+            <a:r>
+              <a:rPr lang="x-none" altLang="en-US"/>
+              <a:t>Security 下沒需求的話就不用改了：</a:t>
+            </a:r>
+            <a:endParaRPr lang="x-none" altLang="en-US"/>
+          </a:p>
+          <a:p>
+            <a:pPr lvl="1"/>
+            <a:r>
+              <a:rPr lang="x-none" altLang="en-US"/>
+              <a:t>    Verified Boot (vboot)  ---&gt;</a:t>
+            </a:r>
+            <a:endParaRPr lang="x-none" altLang="en-US"/>
+          </a:p>
+          <a:p>
+            <a:pPr lvl="1"/>
+            <a:r>
+              <a:rPr lang="x-none" altLang="en-US"/>
+              <a:t>        [ ] Verify firmware with vboot.</a:t>
+            </a:r>
+            <a:endParaRPr lang="x-none" altLang="en-US"/>
+          </a:p>
+          <a:p>
+            <a:pPr lvl="0"/>
+            <a:r>
+              <a:rPr lang="x-none" altLang="en-US"/>
+              <a:t>Console 裏：</a:t>
+            </a:r>
+            <a:endParaRPr lang="x-none" altLang="en-US"/>
+          </a:p>
+          <a:p>
+            <a:pPr lvl="1"/>
+            <a:r>
+              <a:rPr lang="x-none" altLang="en-US"/>
+              <a:t>[*] Squelch AP CPUs from early console.</a:t>
+            </a:r>
+            <a:endParaRPr lang="x-none" altLang="en-US"/>
+          </a:p>
+          <a:p>
+            <a:pPr lvl="1"/>
+            <a:r>
+              <a:rPr lang="x-none" altLang="en-US"/>
+              <a:t>[*]   Send POST codes to an IO port</a:t>
+            </a:r>
+            <a:endParaRPr lang="x-none" altLang="en-US"/>
+          </a:p>
+          <a:p>
+            <a:pPr lvl="0"/>
+            <a:r>
+              <a:rPr lang="x-none" altLang="en-US"/>
+              <a:t>System Table：</a:t>
+            </a:r>
+            <a:endParaRPr lang="x-none" altLang="en-US"/>
+          </a:p>
+          <a:p>
+            <a:pPr lvl="1"/>
+            <a:r>
+              <a:rPr lang="x-none" altLang="en-US"/>
+              <a:t>[*] Generate SMBIOS tables</a:t>
+            </a:r>
+            <a:endParaRPr lang="x-none" altLang="en-US"/>
+          </a:p>
+        </p:txBody>
+      </p:sp>
+      <p:sp>
+        <p:nvSpPr>
+          <p:cNvPr id="4" name="Content Placeholder 2"/>
+          <p:cNvSpPr>
+            <a:spLocks noGrp="1"/>
+          </p:cNvSpPr>
+          <p:nvPr/>
+        </p:nvSpPr>
+        <p:spPr>
+          <a:xfrm>
+            <a:off x="6748145" y="1138555"/>
+            <a:ext cx="5212080" cy="5619750"/>
+          </a:xfrm>
+          <a:prstGeom prst="rect">
+            <a:avLst/>
+          </a:prstGeom>
+        </p:spPr>
+        <p:txBody>
+          <a:bodyPr vert="horz" lIns="91440" tIns="45720" rIns="91440" bIns="45720" rtlCol="0">
+            <a:normAutofit/>
+          </a:bodyPr>
+          <a:lstStyle>
+            <a:lvl1pPr marL="228600" indent="-228600" algn="l" defTabSz="914400" rtl="0" eaLnBrk="1" latinLnBrk="0" hangingPunct="1">
+              <a:lnSpc>
+                <a:spcPct val="90000"/>
+              </a:lnSpc>
+              <a:spcBef>
+                <a:spcPts val="1000"/>
+              </a:spcBef>
+              <a:buFont typeface="Arial" charset="0"/>
+              <a:buChar char="•"/>
+              <a:defRPr sz="2800" kern="1200">
+                <a:solidFill>
+                  <a:schemeClr val="tx1"/>
+                </a:solidFill>
+                <a:latin typeface="+mn-lt"/>
+                <a:ea typeface="+mn-ea"/>
+                <a:cs typeface="+mn-cs"/>
+              </a:defRPr>
+            </a:lvl1pPr>
+            <a:lvl2pPr marL="685800" indent="-228600" algn="l" defTabSz="914400" rtl="0" eaLnBrk="1" latinLnBrk="0" hangingPunct="1">
+              <a:lnSpc>
+                <a:spcPct val="90000"/>
+              </a:lnSpc>
+              <a:spcBef>
+                <a:spcPts val="500"/>
+              </a:spcBef>
+              <a:buFont typeface="Arial" charset="0"/>
+              <a:buChar char="•"/>
+              <a:defRPr sz="2400" kern="1200">
+                <a:solidFill>
+                  <a:schemeClr val="tx1"/>
+                </a:solidFill>
+                <a:latin typeface="+mn-lt"/>
+                <a:ea typeface="+mn-ea"/>
+                <a:cs typeface="+mn-cs"/>
+              </a:defRPr>
+            </a:lvl2pPr>
+            <a:lvl3pPr marL="1143000" indent="-228600" algn="l" defTabSz="914400" rtl="0" eaLnBrk="1" latinLnBrk="0" hangingPunct="1">
+              <a:lnSpc>
+                <a:spcPct val="90000"/>
+              </a:lnSpc>
+              <a:spcBef>
+                <a:spcPts val="500"/>
+              </a:spcBef>
+              <a:buFont typeface="Arial" charset="0"/>
+              <a:buChar char="•"/>
+              <a:defRPr sz="2000" kern="1200">
+                <a:solidFill>
+                  <a:schemeClr val="tx1"/>
+                </a:solidFill>
+                <a:latin typeface="+mn-lt"/>
+                <a:ea typeface="+mn-ea"/>
+                <a:cs typeface="+mn-cs"/>
+              </a:defRPr>
+            </a:lvl3pPr>
+            <a:lvl4pPr marL="1600200" indent="-228600" algn="l" defTabSz="914400" rtl="0" eaLnBrk="1" latinLnBrk="0" hangingPunct="1">
+              <a:lnSpc>
+                <a:spcPct val="90000"/>
+              </a:lnSpc>
+              <a:spcBef>
+                <a:spcPts val="500"/>
+              </a:spcBef>
+              <a:buFont typeface="Arial" charset="0"/>
+              <a:buChar char="•"/>
+              <a:defRPr sz="1800" kern="1200">
+                <a:solidFill>
+                  <a:schemeClr val="tx1"/>
+                </a:solidFill>
+                <a:latin typeface="+mn-lt"/>
+                <a:ea typeface="+mn-ea"/>
+                <a:cs typeface="+mn-cs"/>
+              </a:defRPr>
+            </a:lvl4pPr>
+            <a:lvl5pPr marL="2057400" indent="-228600" algn="l" defTabSz="914400" rtl="0" eaLnBrk="1" latinLnBrk="0" hangingPunct="1">
+              <a:lnSpc>
+                <a:spcPct val="90000"/>
+              </a:lnSpc>
+              <a:spcBef>
+                <a:spcPts val="500"/>
+              </a:spcBef>
+              <a:buFont typeface="Arial" charset="0"/>
+              <a:buChar char="•"/>
+              <a:defRPr sz="1800" kern="1200">
+                <a:solidFill>
+                  <a:schemeClr val="tx1"/>
+                </a:solidFill>
+                <a:latin typeface="+mn-lt"/>
+                <a:ea typeface="+mn-ea"/>
+                <a:cs typeface="+mn-cs"/>
+              </a:defRPr>
+            </a:lvl5pPr>
+            <a:lvl6pPr marL="2514600" indent="-228600" algn="l" defTabSz="914400" rtl="0" eaLnBrk="1" latinLnBrk="0" hangingPunct="1">
+              <a:lnSpc>
+                <a:spcPct val="90000"/>
+              </a:lnSpc>
+              <a:spcBef>
+                <a:spcPts val="500"/>
+              </a:spcBef>
+              <a:buFont typeface="Arial" charset="0"/>
+              <a:buChar char="•"/>
+              <a:defRPr sz="1800" kern="1200">
+                <a:solidFill>
+                  <a:schemeClr val="tx1"/>
+                </a:solidFill>
+                <a:latin typeface="+mn-lt"/>
+                <a:ea typeface="+mn-ea"/>
+                <a:cs typeface="+mn-cs"/>
+              </a:defRPr>
+            </a:lvl6pPr>
+            <a:lvl7pPr marL="2971800" indent="-228600" algn="l" defTabSz="914400" rtl="0" eaLnBrk="1" latinLnBrk="0" hangingPunct="1">
+              <a:lnSpc>
+                <a:spcPct val="90000"/>
+              </a:lnSpc>
+              <a:spcBef>
+                <a:spcPts val="500"/>
+              </a:spcBef>
+              <a:buFont typeface="Arial" charset="0"/>
+              <a:buChar char="•"/>
+              <a:defRPr sz="1800" kern="1200">
+                <a:solidFill>
+                  <a:schemeClr val="tx1"/>
+                </a:solidFill>
+                <a:latin typeface="+mn-lt"/>
+                <a:ea typeface="+mn-ea"/>
+                <a:cs typeface="+mn-cs"/>
+              </a:defRPr>
+            </a:lvl7pPr>
+            <a:lvl8pPr marL="3429000" indent="-228600" algn="l" defTabSz="914400" rtl="0" eaLnBrk="1" latinLnBrk="0" hangingPunct="1">
+              <a:lnSpc>
+                <a:spcPct val="90000"/>
+              </a:lnSpc>
+              <a:spcBef>
+                <a:spcPts val="500"/>
+              </a:spcBef>
+              <a:buFont typeface="Arial" charset="0"/>
+              <a:buChar char="•"/>
+              <a:defRPr sz="1800" kern="1200">
+                <a:solidFill>
+                  <a:schemeClr val="tx1"/>
+                </a:solidFill>
+                <a:latin typeface="+mn-lt"/>
+                <a:ea typeface="+mn-ea"/>
+                <a:cs typeface="+mn-cs"/>
+              </a:defRPr>
+            </a:lvl8pPr>
+            <a:lvl9pPr marL="3886200" indent="-228600" algn="l" defTabSz="914400" rtl="0" eaLnBrk="1" latinLnBrk="0" hangingPunct="1">
+              <a:lnSpc>
+                <a:spcPct val="90000"/>
+              </a:lnSpc>
+              <a:spcBef>
+                <a:spcPts val="500"/>
+              </a:spcBef>
+              <a:buFont typeface="Arial" charset="0"/>
+              <a:buChar char="•"/>
+              <a:defRPr sz="1800" kern="1200">
+                <a:solidFill>
+                  <a:schemeClr val="tx1"/>
+                </a:solidFill>
+                <a:latin typeface="+mn-lt"/>
+                <a:ea typeface="+mn-ea"/>
+                <a:cs typeface="+mn-cs"/>
+              </a:defRPr>
+            </a:lvl9pPr>
+          </a:lstStyle>
+          <a:p>
+            <a:pPr lvl="0"/>
+            <a:endParaRPr lang="x-none" altLang="en-US"/>
+          </a:p>
+        </p:txBody>
+      </p:sp>
+      <p:sp>
+        <p:nvSpPr>
+          <p:cNvPr id="5" name="Text Box 4"/>
+          <p:cNvSpPr txBox="1"/>
+          <p:nvPr/>
+        </p:nvSpPr>
+        <p:spPr>
+          <a:xfrm>
+            <a:off x="6847840" y="1402080"/>
+            <a:ext cx="5022215" cy="5046980"/>
+          </a:xfrm>
+          <a:prstGeom prst="rect">
+            <a:avLst/>
+          </a:prstGeom>
+          <a:noFill/>
+        </p:spPr>
+        <p:txBody>
+          <a:bodyPr wrap="square" rtlCol="0" anchor="t">
+            <a:spAutoFit/>
+          </a:bodyPr>
+          <a:p>
+            <a:pPr marL="285750" indent="-285750">
+              <a:buFont typeface="Arial" charset="0"/>
+              <a:buChar char="•"/>
+            </a:pPr>
+            <a:r>
+              <a:rPr lang="en-US"/>
+              <a:t>Payload 裏比較特殊，需要根據自己的需求選擇 _(:з」∠)_。現在官方支持的 Payload 有：</a:t>
+            </a:r>
+            <a:endParaRPr lang="en-US"/>
+          </a:p>
+          <a:p>
+            <a:pPr marL="742950" lvl="1" indent="-285750">
+              <a:buFont typeface="Arial" charset="0"/>
+              <a:buChar char="•"/>
+            </a:pPr>
+            <a:r>
+              <a:rPr lang="en-US"/>
+              <a:t>None - 無，什麼都沒有。</a:t>
+            </a:r>
+            <a:endParaRPr lang="en-US"/>
+          </a:p>
+          <a:p>
+            <a:pPr marL="742950" lvl="1" indent="-285750">
+              <a:buFont typeface="Arial" charset="0"/>
+              <a:buChar char="•"/>
+            </a:pPr>
+            <a:r>
+              <a:rPr lang="en-US"/>
+              <a:t>An ELF executable payload - 一個 ELF 可執行文件作爲 Payload。</a:t>
+            </a:r>
+            <a:endParaRPr lang="en-US"/>
+          </a:p>
+          <a:p>
+            <a:pPr marL="742950" lvl="1" indent="-285750">
+              <a:buFont typeface="Arial" charset="0"/>
+              <a:buChar char="•"/>
+            </a:pPr>
+            <a:r>
+              <a:rPr lang="en-US"/>
+              <a:t>Bayou - 一個可以從 CBFS（coreboot filesystem）裏選擇並啓動別的 payload 的工具（是不是有點繞）。</a:t>
+            </a:r>
+            <a:endParaRPr lang="en-US"/>
+          </a:p>
+          <a:p>
+            <a:pPr marL="742950" lvl="1" indent="-285750">
+              <a:buFont typeface="Arial" charset="0"/>
+              <a:buChar char="•"/>
+            </a:pPr>
+            <a:r>
+              <a:rPr lang="en-US"/>
+              <a:t>FILO - 一個啓動管理器，比較簡單的那種。</a:t>
+            </a:r>
+            <a:endParaRPr lang="en-US"/>
+          </a:p>
+          <a:p>
+            <a:pPr marL="742950" lvl="1" indent="-285750">
+              <a:buFont typeface="Arial" charset="0"/>
+              <a:buChar char="•"/>
+            </a:pPr>
+            <a:r>
+              <a:rPr lang="en-US"/>
+              <a:t>GRUB2 - 知名啓動管理器。</a:t>
+            </a:r>
+            <a:endParaRPr lang="en-US"/>
+          </a:p>
+          <a:p>
+            <a:pPr marL="742950" lvl="1" indent="-285750">
+              <a:buFont typeface="Arial" charset="0"/>
+              <a:buChar char="•"/>
+            </a:pPr>
+            <a:r>
+              <a:rPr lang="en-US" b="1">
+                <a:solidFill>
+                  <a:srgbClr val="00B050"/>
+                </a:solidFill>
+              </a:rPr>
+              <a:t>SeaBIOS - 一個開源的 BIOS 實現，爲默認選項。</a:t>
+            </a:r>
+            <a:endParaRPr lang="en-US" b="1">
+              <a:solidFill>
+                <a:srgbClr val="00B050"/>
+              </a:solidFill>
+            </a:endParaRPr>
+          </a:p>
+          <a:p>
+            <a:pPr marL="742950" lvl="1" indent="-285750">
+              <a:buFont typeface="Arial" charset="0"/>
+              <a:buChar char="•"/>
+            </a:pPr>
+            <a:r>
+              <a:rPr lang="en-US"/>
+              <a:t>U-Boot - 熟悉 ARM 的朋友應該知道（跑A Linux payload - 直接把一個 Linux 內核作爲 payload 塞進去。</a:t>
+            </a:r>
+            <a:endParaRPr lang="en-US"/>
+          </a:p>
+          <a:p>
+            <a:pPr marL="742950" lvl="1" indent="-285750">
+              <a:buFont typeface="Arial" charset="0"/>
+              <a:buChar char="•"/>
+            </a:pPr>
+            <a:r>
+              <a:rPr lang="en-US"/>
+              <a:t>Tianocore coreboot payload package - 開源的 UEFI 實現。</a:t>
+            </a:r>
+            <a:endParaRPr lang="en-US"/>
+          </a:p>
+        </p:txBody>
+      </p:sp>
+    </p:spTree>
+  </p:cSld>
+  <p:clrMapOvr>
+    <a:masterClrMapping/>
+  </p:clrMapOvr>
+</p:sld>
+</file>
+
+<file path=ppt/slides/slide17.xml><?xml version="1.0" encoding="utf-8"?>
+<p:sld xmlns:a="http://schemas.openxmlformats.org/drawingml/2006/main" xmlns:r="http://schemas.openxmlformats.org/officeDocument/2006/relationships" xmlns:p="http://schemas.openxmlformats.org/presentationml/2006/main">
+  <p:cSld>
+    <p:spTree>
+      <p:nvGrpSpPr>
+        <p:cNvPr id="1" name=""/>
+        <p:cNvGrpSpPr/>
+        <p:nvPr/>
+      </p:nvGrpSpPr>
+      <p:grpSpPr/>
+      <p:sp>
+        <p:nvSpPr>
+          <p:cNvPr id="2" name="Title 1"/>
+          <p:cNvSpPr>
+            <a:spLocks noGrp="1"/>
+          </p:cNvSpPr>
+          <p:nvPr>
+            <p:ph type="title"/>
+          </p:nvPr>
+        </p:nvSpPr>
+        <p:spPr>
+          <a:xfrm>
+            <a:off x="838200" y="193675"/>
+            <a:ext cx="10515600" cy="934720"/>
+          </a:xfrm>
+        </p:spPr>
+        <p:txBody>
+          <a:bodyPr>
+            <a:normAutofit fontScale="90000"/>
+          </a:bodyPr>
+          <a:p>
+            <a:r>
+              <a:rPr lang="en-US"/>
+              <a:t>使用coreboot </a:t>
+            </a:r>
+            <a:r>
+              <a:rPr lang="x-none" altLang="en-US"/>
+              <a:t>(6/6)</a:t>
+            </a:r>
+            <a:br>
+              <a:rPr lang="en-US"/>
+            </a:br>
+            <a:r>
+              <a:rPr lang="en-US" sz="2400"/>
+              <a:t>https://v2bv.net/2018/coreboot</a:t>
+            </a:r>
+            <a:endParaRPr lang="en-US" sz="2400"/>
+          </a:p>
+        </p:txBody>
+      </p:sp>
+      <p:sp>
+        <p:nvSpPr>
+          <p:cNvPr id="3" name="Content Placeholder 2"/>
+          <p:cNvSpPr>
+            <a:spLocks noGrp="1"/>
+          </p:cNvSpPr>
+          <p:nvPr>
+            <p:ph idx="1"/>
+          </p:nvPr>
+        </p:nvSpPr>
+        <p:spPr>
+          <a:xfrm>
+            <a:off x="840105" y="1151255"/>
+            <a:ext cx="11002645" cy="5619750"/>
+          </a:xfrm>
+        </p:spPr>
+        <p:txBody>
+          <a:bodyPr>
+            <a:normAutofit fontScale="90000" lnSpcReduction="10000"/>
+          </a:bodyPr>
+          <a:p>
+            <a:pPr lvl="0"/>
+            <a:r>
+              <a:rPr lang="x-none" altLang="en-US"/>
+              <a:t>全部配置好之後保存然後退出。使用 make,編譯好的固件在源碼目錄的 build/coreboot.rom。</a:t>
+            </a:r>
+            <a:endParaRPr lang="x-none" altLang="en-US"/>
+          </a:p>
+          <a:p>
+            <a:pPr lvl="0"/>
+            <a:r>
+              <a:rPr lang="x-none" altLang="en-US"/>
+              <a:t>進入 build 目錄下就可以用 flashrom 刷了。</a:t>
+            </a:r>
+            <a:endParaRPr lang="x-none" altLang="en-US"/>
+          </a:p>
+          <a:p>
+            <a:pPr lvl="1"/>
+            <a:r>
+              <a:rPr lang="x-none" altLang="en-US"/>
+              <a:t>$ sudo flashrom -p internal:laptop=force_I_want_a_brick -c MX25L6405D -w coreboot.rom # 同樣的，這裏的命令也是 internal flash 的命令，如果用編程器的話需要根據情況進行修改。</a:t>
+            </a:r>
+            <a:endParaRPr lang="x-none" altLang="en-US"/>
+          </a:p>
+          <a:p>
+            <a:pPr lvl="0"/>
+            <a:r>
+              <a:rPr lang="x-none" altLang="en-US"/>
+              <a:t>如何配置 GRUB2</a:t>
+            </a:r>
+            <a:endParaRPr lang="x-none" altLang="en-US"/>
+          </a:p>
+          <a:p>
+            <a:pPr lvl="1"/>
+            <a:r>
+              <a:rPr lang="x-none" altLang="en-US"/>
+              <a:t>GRUB2 需要一個配置文件才能正常工作，詳細情況可以參考 https://github.com/hardenedlinux/Debian-GNU-Linux-Profiles/blob/master/docs/hardened_boot/grub-for-coreboot.md</a:t>
+            </a:r>
+            <a:endParaRPr lang="x-none" altLang="en-US"/>
+          </a:p>
+          <a:p>
+            <a:pPr lvl="1"/>
+            <a:r>
+              <a:rPr lang="x-none" altLang="en-US"/>
+              <a:t>幾個注意點：</a:t>
+            </a:r>
+            <a:endParaRPr lang="x-none" altLang="en-US"/>
+          </a:p>
+          <a:p>
+            <a:pPr lvl="2"/>
+            <a:r>
+              <a:rPr lang="x-none" altLang="en-US"/>
+              <a:t>一些經常變動的東西可以寫到硬盤上讓 GRUB 自己去加載，而不是寫到固件裏面。</a:t>
+            </a:r>
+            <a:endParaRPr lang="x-none" altLang="en-US"/>
+          </a:p>
+          <a:p>
+            <a:pPr lvl="2"/>
+            <a:r>
+              <a:rPr lang="x-none" altLang="en-US"/>
+              <a:t>(memdisk) 和 (cbfsdisk) 要區分清楚，(cbfsdisk) 是 ROM 裏的 CBFS 區域，而 (memdisk) 是 grub-mkstandalone 時包括進去的部分。</a:t>
+            </a:r>
+            <a:endParaRPr lang="x-none" altLang="en-US"/>
+          </a:p>
+          <a:p>
+            <a:pPr lvl="2"/>
+            <a:r>
+              <a:rPr lang="x-none" altLang="en-US"/>
+              <a:t>如果圖形相關選擇的是 native init 的 high-resolution framebuffer，並且進去後發現只有四分之一個屏幕可用的話可以試着在配置裏加上 gfxpayload=keep 和 terminal_output --append gfxterm，應該可以讓它恢復正常。</a:t>
+            </a:r>
+            <a:endParaRPr lang="x-none" altLang="en-US"/>
           </a:p>
         </p:txBody>
       </p:sp>
@@ -5072,6 +6833,8 @@
       </a:bgFillStyleLst>
     </a:fmtScheme>
   </a:themeElements>
+  <a:objectDefaults/>
+  <a:extraClrSchemeLst/>
   <a:extLst>
     <a:ext uri="{05A4C25C-085E-4340-85A3-A5531E510DB2}">
       <thm15:themeFamily xmlns:thm15="http://schemas.microsoft.com/office/thememl/2012/main" name="Office Theme" id="{62F939B6-93AF-4DB8-9C6B-D6C7DFDC589F}" vid="{4A3C46E8-61CC-4603-A589-7422A47A8E4A}"/>
@@ -5331,6 +7094,8 @@
       </a:bgFillStyleLst>
     </a:fmtScheme>
   </a:themeElements>
+  <a:objectDefaults/>
+  <a:extraClrSchemeLst/>
   <a:extLst>
     <a:ext uri="{05A4C25C-085E-4340-85A3-A5531E510DB2}">
       <thm15:themeFamily xmlns:thm15="http://schemas.microsoft.com/office/thememl/2012/main" name="Office Theme" id="{62F939B6-93AF-4DB8-9C6B-D6C7DFDC589F}" vid="{4A3C46E8-61CC-4603-A589-7422A47A8E4A}"/>

</xml_diff>

<commit_message>
Add share folder inside and outside of chroot
</commit_message>
<xml_diff>
--- a/UnderstandOfChromiumOS.pptx
+++ b/UnderstandOfChromiumOS.pptx
@@ -25,6 +25,9 @@
     <p:sldId id="274" r:id="rId18"/>
     <p:sldId id="275" r:id="rId19"/>
     <p:sldId id="276" r:id="rId20"/>
+    <p:sldId id="277" r:id="rId21"/>
+    <p:sldId id="278" r:id="rId22"/>
+    <p:sldId id="279" r:id="rId23"/>
   </p:sldIdLst>
   <p:sldSz cx="12192000" cy="6858000"/>
   <p:notesSz cx="6858000" cy="9144000"/>
@@ -5284,6 +5287,336 @@
 </p:sld>
 </file>
 
+<file path=ppt/slides/slide18.xml><?xml version="1.0" encoding="utf-8"?>
+<p:sld xmlns:a="http://schemas.openxmlformats.org/drawingml/2006/main" xmlns:r="http://schemas.openxmlformats.org/officeDocument/2006/relationships" xmlns:p="http://schemas.openxmlformats.org/presentationml/2006/main">
+  <p:cSld>
+    <p:spTree>
+      <p:nvGrpSpPr>
+        <p:cNvPr id="1" name=""/>
+        <p:cNvGrpSpPr/>
+        <p:nvPr/>
+      </p:nvGrpSpPr>
+      <p:grpSpPr/>
+      <p:sp>
+        <p:nvSpPr>
+          <p:cNvPr id="2" name="Title 1"/>
+          <p:cNvSpPr>
+            <a:spLocks noGrp="1"/>
+          </p:cNvSpPr>
+          <p:nvPr>
+            <p:ph type="title"/>
+          </p:nvPr>
+        </p:nvSpPr>
+        <p:spPr>
+          <a:xfrm>
+            <a:off x="838200" y="366395"/>
+            <a:ext cx="10515600" cy="635635"/>
+          </a:xfrm>
+        </p:spPr>
+        <p:txBody>
+          <a:bodyPr>
+            <a:normAutofit fontScale="90000"/>
+          </a:bodyPr>
+          <a:p>
+            <a:r>
+              <a:rPr lang="x-none" altLang="en-US"/>
+              <a:t>How to use Crouton to run Ubuntu inside Chromium OS</a:t>
+            </a:r>
+            <a:endParaRPr lang="x-none" altLang="en-US"/>
+          </a:p>
+        </p:txBody>
+      </p:sp>
+      <p:sp>
+        <p:nvSpPr>
+          <p:cNvPr id="3" name="Content Placeholder 2"/>
+          <p:cNvSpPr>
+            <a:spLocks noGrp="1"/>
+          </p:cNvSpPr>
+          <p:nvPr>
+            <p:ph idx="1"/>
+          </p:nvPr>
+        </p:nvSpPr>
+        <p:spPr>
+          <a:xfrm>
+            <a:off x="839470" y="1370330"/>
+            <a:ext cx="5544185" cy="5262245"/>
+          </a:xfrm>
+        </p:spPr>
+        <p:txBody>
+          <a:bodyPr>
+            <a:normAutofit fontScale="55000"/>
+          </a:bodyPr>
+          <a:p>
+            <a:r>
+              <a:rPr lang="en-US"/>
+              <a:t>Step 1. Enabling Developer Mode</a:t>
+            </a:r>
+            <a:endParaRPr lang="en-US"/>
+          </a:p>
+          <a:p>
+            <a:r>
+              <a:rPr lang="en-US"/>
+              <a:t>Step 2. Installing Crouton</a:t>
+            </a:r>
+            <a:endParaRPr lang="en-US"/>
+          </a:p>
+          <a:p>
+            <a:pPr lvl="1"/>
+            <a:r>
+              <a:rPr lang="en-US"/>
+              <a:t>Step 2.1 Download the latest release of Crouton to your Chromebook: http://goo.gl/fd3zc</a:t>
+            </a:r>
+            <a:endParaRPr lang="en-US"/>
+          </a:p>
+          <a:p>
+            <a:pPr lvl="1"/>
+            <a:r>
+              <a:rPr lang="en-US"/>
+              <a:t>Step 2.2 Install Crouton with the Xfce desktop</a:t>
+            </a:r>
+            <a:endParaRPr lang="en-US"/>
+          </a:p>
+          <a:p>
+            <a:pPr lvl="0"/>
+            <a:r>
+              <a:rPr lang="en-US"/>
+              <a:t>Step 3. Run Ubuntu - sudo startxfce4</a:t>
+            </a:r>
+            <a:endParaRPr lang="en-US"/>
+          </a:p>
+          <a:p>
+            <a:pPr lvl="0"/>
+            <a:r>
+              <a:rPr lang="en-US"/>
+              <a:t>Step 4. OS switch</a:t>
+            </a:r>
+            <a:endParaRPr lang="en-US"/>
+          </a:p>
+          <a:p>
+            <a:pPr lvl="1"/>
+            <a:r>
+              <a:rPr lang="en-US"/>
+              <a:t>Chrome OS -&gt; Ubuntu : Alt+Ctrl+Shift+Back</a:t>
+            </a:r>
+            <a:endParaRPr lang="en-US"/>
+          </a:p>
+          <a:p>
+            <a:pPr lvl="1"/>
+            <a:r>
+              <a:rPr lang="en-US"/>
+              <a:t>Ubuntu -&gt; Chrome OS : lt+Ctrl+Shift+Forward</a:t>
+            </a:r>
+            <a:endParaRPr lang="en-US"/>
+          </a:p>
+          <a:p>
+            <a:pPr lvl="0"/>
+            <a:r>
+              <a:rPr lang="en-US"/>
+              <a:t>Advanced installation:</a:t>
+            </a:r>
+            <a:endParaRPr lang="en-US"/>
+          </a:p>
+          <a:p>
+            <a:pPr lvl="1"/>
+            <a:r>
+              <a:rPr lang="en-US"/>
+              <a:t>sudo -i</a:t>
+            </a:r>
+            <a:endParaRPr lang="en-US"/>
+          </a:p>
+          <a:p>
+            <a:pPr lvl="1"/>
+            <a:r>
+              <a:rPr lang="en-US"/>
+              <a:t>cd /home/user/{uuid}/Download</a:t>
+            </a:r>
+            <a:endParaRPr lang="en-US"/>
+          </a:p>
+          <a:p>
+            <a:pPr lvl="1"/>
+            <a:r>
+              <a:rPr lang="en-US"/>
+              <a:t>List available target: sh ./crouton -t list</a:t>
+            </a:r>
+            <a:endParaRPr lang="en-US"/>
+          </a:p>
+          <a:p>
+            <a:pPr lvl="1"/>
+            <a:r>
+              <a:rPr lang="en-US"/>
+              <a:t>List available release: sh ./crouton -r list</a:t>
+            </a:r>
+            <a:endParaRPr lang="en-US"/>
+          </a:p>
+          <a:p>
+            <a:pPr lvl="1"/>
+            <a:r>
+              <a:rPr lang="en-US"/>
+              <a:t>Install Ubuntu 14.04 w/ Unity: sh ./crouton -t unity-desktop -r trusty</a:t>
+            </a:r>
+            <a:endParaRPr lang="en-US"/>
+          </a:p>
+          <a:p>
+            <a:pPr lvl="1"/>
+            <a:r>
+              <a:rPr lang="en-US"/>
+              <a:t>Install Xfce w/ applications: sh ./crouton -t xfce-desktop</a:t>
+            </a:r>
+            <a:endParaRPr lang="en-US"/>
+          </a:p>
+          <a:p>
+            <a:pPr lvl="1"/>
+            <a:r>
+              <a:rPr lang="en-US"/>
+              <a:t>Install LXDE w/ applications: sh ./crouton -t lxde-desktop</a:t>
+            </a:r>
+            <a:endParaRPr lang="en-US"/>
+          </a:p>
+          <a:p>
+            <a:pPr lvl="1"/>
+            <a:r>
+              <a:rPr lang="en-US"/>
+              <a:t>Install GNOME w/ applications: sh  ./crouton -t gnome-desktop</a:t>
+            </a:r>
+            <a:endParaRPr lang="en-US"/>
+          </a:p>
+          <a:p>
+            <a:pPr lvl="1"/>
+            <a:r>
+              <a:rPr lang="en-US"/>
+              <a:t>Install KDE w/ applications: sh  ./crouton -t kde-desktop</a:t>
+            </a:r>
+            <a:endParaRPr lang="en-US"/>
+          </a:p>
+        </p:txBody>
+      </p:sp>
+      <p:pic>
+        <p:nvPicPr>
+          <p:cNvPr id="4" name="Picture 3"/>
+          <p:cNvPicPr>
+            <a:picLocks noChangeAspect="1"/>
+          </p:cNvPicPr>
+          <p:nvPr/>
+        </p:nvPicPr>
+        <p:blipFill>
+          <a:blip r:embed="rId1"/>
+          <a:stretch>
+            <a:fillRect/>
+          </a:stretch>
+        </p:blipFill>
+        <p:spPr>
+          <a:xfrm>
+            <a:off x="6176010" y="690880"/>
+            <a:ext cx="2528570" cy="1467485"/>
+          </a:xfrm>
+          <a:prstGeom prst="rect">
+            <a:avLst/>
+          </a:prstGeom>
+        </p:spPr>
+      </p:pic>
+      <p:pic>
+        <p:nvPicPr>
+          <p:cNvPr id="5" name="Picture 4"/>
+          <p:cNvPicPr>
+            <a:picLocks noChangeAspect="1"/>
+          </p:cNvPicPr>
+          <p:nvPr/>
+        </p:nvPicPr>
+        <p:blipFill>
+          <a:blip r:embed="rId2"/>
+          <a:stretch>
+            <a:fillRect/>
+          </a:stretch>
+        </p:blipFill>
+        <p:spPr>
+          <a:xfrm>
+            <a:off x="7933690" y="2216150"/>
+            <a:ext cx="3998595" cy="3609975"/>
+          </a:xfrm>
+          <a:prstGeom prst="rect">
+            <a:avLst/>
+          </a:prstGeom>
+        </p:spPr>
+      </p:pic>
+    </p:spTree>
+  </p:cSld>
+  <p:clrMapOvr>
+    <a:masterClrMapping/>
+  </p:clrMapOvr>
+</p:sld>
+</file>
+
+<file path=ppt/slides/slide19.xml><?xml version="1.0" encoding="utf-8"?>
+<p:sld xmlns:a="http://schemas.openxmlformats.org/drawingml/2006/main" xmlns:r="http://schemas.openxmlformats.org/officeDocument/2006/relationships" xmlns:p="http://schemas.openxmlformats.org/presentationml/2006/main">
+  <p:cSld>
+    <p:spTree>
+      <p:nvGrpSpPr>
+        <p:cNvPr id="1" name=""/>
+        <p:cNvGrpSpPr/>
+        <p:nvPr/>
+      </p:nvGrpSpPr>
+      <p:grpSpPr/>
+      <p:sp>
+        <p:nvSpPr>
+          <p:cNvPr id="2" name="Title 1"/>
+          <p:cNvSpPr>
+            <a:spLocks noGrp="1"/>
+          </p:cNvSpPr>
+          <p:nvPr>
+            <p:ph type="title"/>
+          </p:nvPr>
+        </p:nvSpPr>
+        <p:spPr>
+          <a:xfrm>
+            <a:off x="838200" y="365125"/>
+            <a:ext cx="10515600" cy="730250"/>
+          </a:xfrm>
+        </p:spPr>
+        <p:txBody>
+          <a:bodyPr>
+            <a:normAutofit/>
+          </a:bodyPr>
+          <a:p>
+            <a:r>
+              <a:rPr lang="x-none" altLang="en-US" sz="3600"/>
+              <a:t>How to Change Date Time inside Chromium OS</a:t>
+            </a:r>
+            <a:endParaRPr lang="x-none" altLang="en-US" sz="3600"/>
+          </a:p>
+        </p:txBody>
+      </p:sp>
+      <p:pic>
+        <p:nvPicPr>
+          <p:cNvPr id="4" name="Picture 3" descr="Screenshot from 2018-09-26 16-41-51"/>
+          <p:cNvPicPr>
+            <a:picLocks noChangeAspect="1"/>
+          </p:cNvPicPr>
+          <p:nvPr/>
+        </p:nvPicPr>
+        <p:blipFill>
+          <a:blip r:embed="rId1"/>
+          <a:stretch>
+            <a:fillRect/>
+          </a:stretch>
+        </p:blipFill>
+        <p:spPr>
+          <a:xfrm>
+            <a:off x="934720" y="1111885"/>
+            <a:ext cx="10058400" cy="5657215"/>
+          </a:xfrm>
+          <a:prstGeom prst="rect">
+            <a:avLst/>
+          </a:prstGeom>
+        </p:spPr>
+      </p:pic>
+    </p:spTree>
+  </p:cSld>
+  <p:clrMapOvr>
+    <a:masterClrMapping/>
+  </p:clrMapOvr>
+</p:sld>
+</file>
+
 <file path=ppt/slides/slide2.xml><?xml version="1.0" encoding="utf-8"?>
 <p:sld xmlns:a="http://schemas.openxmlformats.org/drawingml/2006/main" xmlns:r="http://schemas.openxmlformats.org/officeDocument/2006/relationships" xmlns:p="http://schemas.openxmlformats.org/presentationml/2006/main">
   <p:cSld>
@@ -5388,6 +5721,133 @@
               <a:t>.</a:t>
             </a:r>
             <a:endParaRPr lang="en-US" altLang="zh-CN"/>
+          </a:p>
+        </p:txBody>
+      </p:sp>
+    </p:spTree>
+  </p:cSld>
+  <p:clrMapOvr>
+    <a:masterClrMapping/>
+  </p:clrMapOvr>
+</p:sld>
+</file>
+
+<file path=ppt/slides/slide20.xml><?xml version="1.0" encoding="utf-8"?>
+<p:sld xmlns:a="http://schemas.openxmlformats.org/drawingml/2006/main" xmlns:r="http://schemas.openxmlformats.org/officeDocument/2006/relationships" xmlns:p="http://schemas.openxmlformats.org/presentationml/2006/main">
+  <p:cSld>
+    <p:spTree>
+      <p:nvGrpSpPr>
+        <p:cNvPr id="1" name=""/>
+        <p:cNvGrpSpPr/>
+        <p:nvPr/>
+      </p:nvGrpSpPr>
+      <p:grpSpPr/>
+      <p:sp>
+        <p:nvSpPr>
+          <p:cNvPr id="2" name="Title 1"/>
+          <p:cNvSpPr>
+            <a:spLocks noGrp="1"/>
+          </p:cNvSpPr>
+          <p:nvPr>
+            <p:ph type="title"/>
+          </p:nvPr>
+        </p:nvSpPr>
+        <p:spPr>
+          <a:xfrm>
+            <a:off x="838200" y="363855"/>
+            <a:ext cx="10515600" cy="885825"/>
+          </a:xfrm>
+        </p:spPr>
+        <p:txBody>
+          <a:bodyPr>
+            <a:normAutofit fontScale="90000"/>
+          </a:bodyPr>
+          <a:p>
+            <a:r>
+              <a:rPr lang="x-none" altLang="en-US"/>
+              <a:t>How to share files for inside and outside chroot</a:t>
+            </a:r>
+            <a:endParaRPr lang="x-none" altLang="en-US"/>
+          </a:p>
+        </p:txBody>
+      </p:sp>
+      <p:sp>
+        <p:nvSpPr>
+          <p:cNvPr id="3" name="Content Placeholder 2"/>
+          <p:cNvSpPr>
+            <a:spLocks noGrp="1"/>
+          </p:cNvSpPr>
+          <p:nvPr>
+            <p:ph idx="1"/>
+          </p:nvPr>
+        </p:nvSpPr>
+        <p:spPr>
+          <a:xfrm>
+            <a:off x="838200" y="1767840"/>
+            <a:ext cx="10515600" cy="4752975"/>
+          </a:xfrm>
+        </p:spPr>
+        <p:txBody>
+          <a:bodyPr>
+            <a:normAutofit fontScale="90000" lnSpcReduction="20000"/>
+          </a:bodyPr>
+          <a:p>
+            <a:r>
+              <a:rPr lang="en-US"/>
+              <a:t>The cros_sdk command supports mounting additional directories into your chroot environment.  This can be used to share editor configurations, a directory full of recovery images, etc.</a:t>
+            </a:r>
+            <a:endParaRPr lang="en-US"/>
+          </a:p>
+          <a:p>
+            <a:r>
+              <a:rPr lang="en-US"/>
+              <a:t>You can create a src/scripts/.local_mounts file listing all the directories (outside of the chroot) that you'd like to access inside the chroot. </a:t>
+            </a:r>
+            <a:r>
+              <a:rPr lang="x-none" altLang="en-US"/>
+              <a:t>For example:</a:t>
+            </a:r>
+            <a:endParaRPr lang="x-none" altLang="en-US"/>
+          </a:p>
+          <a:p>
+            <a:pPr lvl="1"/>
+            <a:r>
+              <a:rPr lang="x-none" altLang="en-US"/>
+              <a:t> # source(path outside chroot) destination(path inside chroot)</a:t>
+            </a:r>
+            <a:endParaRPr lang="x-none" altLang="en-US"/>
+          </a:p>
+          <a:p>
+            <a:pPr lvl="1"/>
+            <a:r>
+              <a:rPr lang="x-none" altLang="en-US"/>
+              <a:t>/usr/share/vim/google</a:t>
+            </a:r>
+            <a:endParaRPr lang="x-none" altLang="en-US"/>
+          </a:p>
+          <a:p>
+            <a:pPr lvl="1"/>
+            <a:r>
+              <a:rPr lang="x-none" altLang="en-US"/>
+              <a:t>/home/YOURID/Downloads /Downloads</a:t>
+            </a:r>
+            <a:endParaRPr lang="x-none" altLang="en-US"/>
+          </a:p>
+          <a:p>
+            <a:pPr lvl="0"/>
+            <a:r>
+              <a:rPr lang="x-none" altLang="en-US"/>
+              <a:t>Each line of .local_mounts refers to a directory you'd like to mount, and where you'd like it mounted. For security and safety reasons, all directories mounted via .local_mounts will be read-only.</a:t>
+            </a:r>
+            <a:endParaRPr lang="x-none" altLang="en-US"/>
+          </a:p>
+          <a:p>
+            <a:pPr lvl="0"/>
+            <a:r>
+              <a:rPr lang="x-none" altLang="en-US"/>
+              <a:t>Reference: http://dev.chromium.org/chromium-os/tips-and-tricks-for-chromium-os-developers</a:t>
+            </a:r>
+            <a:endParaRPr lang="x-none" altLang="en-US"/>
           </a:p>
         </p:txBody>
       </p:sp>

</xml_diff>